<commit_message>
updated presentation, removed duplicate thesis pdf
</commit_message>
<xml_diff>
--- a/documentation/seitenbau/praesentation.pptx
+++ b/documentation/seitenbau/praesentation.pptx
@@ -235,7 +235,7 @@
           <a:p>
             <a:fld id="{43C08B2D-10D7-454A-8AB6-5BBBD7142FDB}" type="datetimeFigureOut">
               <a:rPr lang="de-DE" smtClean="0"/>
-              <a:t>18.12.2013</a:t>
+              <a:t>08.01.2014</a:t>
             </a:fld>
             <a:endParaRPr lang="de-DE"/>
           </a:p>
@@ -1383,7 +1383,7 @@
           <a:p>
             <a:fld id="{3D3F076A-37B1-4513-9F6B-CFB0CEF8E9AA}" type="datetimeFigureOut">
               <a:rPr lang="de-DE" smtClean="0"/>
-              <a:t>18.12.2013</a:t>
+              <a:t>08.01.2014</a:t>
             </a:fld>
             <a:endParaRPr lang="de-DE"/>
           </a:p>
@@ -1548,7 +1548,7 @@
           <a:p>
             <a:fld id="{3D3F076A-37B1-4513-9F6B-CFB0CEF8E9AA}" type="datetimeFigureOut">
               <a:rPr lang="de-DE" smtClean="0"/>
-              <a:t>18.12.2013</a:t>
+              <a:t>08.01.2014</a:t>
             </a:fld>
             <a:endParaRPr lang="de-DE"/>
           </a:p>
@@ -1723,7 +1723,7 @@
           <a:p>
             <a:fld id="{3D3F076A-37B1-4513-9F6B-CFB0CEF8E9AA}" type="datetimeFigureOut">
               <a:rPr lang="de-DE" smtClean="0"/>
-              <a:t>18.12.2013</a:t>
+              <a:t>08.01.2014</a:t>
             </a:fld>
             <a:endParaRPr lang="de-DE"/>
           </a:p>
@@ -1888,7 +1888,7 @@
           <a:p>
             <a:fld id="{3D3F076A-37B1-4513-9F6B-CFB0CEF8E9AA}" type="datetimeFigureOut">
               <a:rPr lang="de-DE" smtClean="0"/>
-              <a:t>18.12.2013</a:t>
+              <a:t>08.01.2014</a:t>
             </a:fld>
             <a:endParaRPr lang="de-DE"/>
           </a:p>
@@ -2129,7 +2129,7 @@
           <a:p>
             <a:fld id="{3D3F076A-37B1-4513-9F6B-CFB0CEF8E9AA}" type="datetimeFigureOut">
               <a:rPr lang="de-DE" smtClean="0"/>
-              <a:t>18.12.2013</a:t>
+              <a:t>08.01.2014</a:t>
             </a:fld>
             <a:endParaRPr lang="de-DE"/>
           </a:p>
@@ -2412,7 +2412,7 @@
           <a:p>
             <a:fld id="{3D3F076A-37B1-4513-9F6B-CFB0CEF8E9AA}" type="datetimeFigureOut">
               <a:rPr lang="de-DE" smtClean="0"/>
-              <a:t>18.12.2013</a:t>
+              <a:t>08.01.2014</a:t>
             </a:fld>
             <a:endParaRPr lang="de-DE"/>
           </a:p>
@@ -2829,7 +2829,7 @@
           <a:p>
             <a:fld id="{3D3F076A-37B1-4513-9F6B-CFB0CEF8E9AA}" type="datetimeFigureOut">
               <a:rPr lang="de-DE" smtClean="0"/>
-              <a:t>18.12.2013</a:t>
+              <a:t>08.01.2014</a:t>
             </a:fld>
             <a:endParaRPr lang="de-DE"/>
           </a:p>
@@ -2942,7 +2942,7 @@
           <a:p>
             <a:fld id="{3D3F076A-37B1-4513-9F6B-CFB0CEF8E9AA}" type="datetimeFigureOut">
               <a:rPr lang="de-DE" smtClean="0"/>
-              <a:t>18.12.2013</a:t>
+              <a:t>08.01.2014</a:t>
             </a:fld>
             <a:endParaRPr lang="de-DE"/>
           </a:p>
@@ -3032,7 +3032,7 @@
           <a:p>
             <a:fld id="{3D3F076A-37B1-4513-9F6B-CFB0CEF8E9AA}" type="datetimeFigureOut">
               <a:rPr lang="de-DE" smtClean="0"/>
-              <a:t>18.12.2013</a:t>
+              <a:t>08.01.2014</a:t>
             </a:fld>
             <a:endParaRPr lang="de-DE"/>
           </a:p>
@@ -3304,7 +3304,7 @@
           <a:p>
             <a:fld id="{3D3F076A-37B1-4513-9F6B-CFB0CEF8E9AA}" type="datetimeFigureOut">
               <a:rPr lang="de-DE" smtClean="0"/>
-              <a:t>18.12.2013</a:t>
+              <a:t>08.01.2014</a:t>
             </a:fld>
             <a:endParaRPr lang="de-DE"/>
           </a:p>
@@ -3552,7 +3552,7 @@
           <a:p>
             <a:fld id="{3D3F076A-37B1-4513-9F6B-CFB0CEF8E9AA}" type="datetimeFigureOut">
               <a:rPr lang="de-DE" smtClean="0"/>
-              <a:t>18.12.2013</a:t>
+              <a:t>08.01.2014</a:t>
             </a:fld>
             <a:endParaRPr lang="de-DE"/>
           </a:p>
@@ -3760,7 +3760,7 @@
           <a:p>
             <a:fld id="{3D3F076A-37B1-4513-9F6B-CFB0CEF8E9AA}" type="datetimeFigureOut">
               <a:rPr lang="de-DE" smtClean="0"/>
-              <a:t>18.12.2013</a:t>
+              <a:t>08.01.2014</a:t>
             </a:fld>
             <a:endParaRPr lang="de-DE"/>
           </a:p>
@@ -4641,7 +4641,6 @@
               <a:rPr lang="de-DE" dirty="0" smtClean="0"/>
               <a:t>Nutzbar als Maven-Artefakt</a:t>
             </a:r>
-            <a:endParaRPr lang="de-DE" dirty="0" smtClean="0"/>
           </a:p>
           <a:p>
             <a:pPr marL="0" indent="0">
@@ -9390,25 +9389,8 @@
           <a:p>
             <a:r>
               <a:rPr lang="de-DE" dirty="0" smtClean="0"/>
-              <a:t>Beschreibungen </a:t>
-            </a:r>
-            <a:r>
-              <a:rPr lang="de-DE" dirty="0" smtClean="0"/>
-              <a:t>von </a:t>
-            </a:r>
-            <a:r>
-              <a:rPr lang="de-DE" dirty="0" smtClean="0"/>
-              <a:t>Beziehungen (auf Entit</a:t>
-            </a:r>
-            <a:r>
-              <a:rPr lang="de-DE" dirty="0" smtClean="0"/>
-              <a:t>äten-Ebene)</a:t>
-            </a:r>
-            <a:r>
-              <a:rPr lang="de-DE" dirty="0" smtClean="0"/>
-              <a:t>:</a:t>
-            </a:r>
-            <a:endParaRPr lang="de-DE" dirty="0" smtClean="0"/>
+              <a:t>Beschreibungen von Beziehungen (auf Entitäten-Ebene):</a:t>
+            </a:r>
           </a:p>
           <a:p>
             <a:endParaRPr lang="de-DE" dirty="0"/>
@@ -9481,304 +9463,376 @@
           <a:lstStyle/>
           <a:p>
             <a:r>
+              <a:rPr lang="de-DE" b="1" dirty="0" err="1" smtClean="0">
+                <a:solidFill>
+                  <a:srgbClr val="972C78"/>
+                </a:solidFill>
+                <a:latin typeface="Consolas" panose="020B0609020204030204" pitchFamily="49" charset="0"/>
+              </a:rPr>
+              <a:t>def</a:t>
+            </a:r>
+            <a:r>
+              <a:rPr lang="de-DE" dirty="0" smtClean="0">
+                <a:solidFill>
+                  <a:srgbClr val="000000"/>
+                </a:solidFill>
+                <a:latin typeface="Consolas" panose="020B0609020204030204" pitchFamily="49" charset="0"/>
+              </a:rPr>
+              <a:t> </a:t>
+            </a:r>
+            <a:r>
               <a:rPr lang="de-DE" dirty="0" err="1">
                 <a:solidFill>
+                  <a:srgbClr val="000000"/>
+                </a:solidFill>
+                <a:latin typeface="Consolas" panose="020B0609020204030204" pitchFamily="49" charset="0"/>
+              </a:rPr>
+              <a:t>relations</a:t>
+            </a:r>
+            <a:r>
+              <a:rPr lang="de-DE" dirty="0">
+                <a:solidFill>
+                  <a:srgbClr val="000000"/>
+                </a:solidFill>
+                <a:latin typeface="Consolas" panose="020B0609020204030204" pitchFamily="49" charset="0"/>
+              </a:rPr>
+              <a:t>() {</a:t>
+            </a:r>
+          </a:p>
+          <a:p>
+            <a:r>
+              <a:rPr lang="de-DE" dirty="0" smtClean="0">
+                <a:solidFill>
+                  <a:srgbClr val="000000"/>
+                </a:solidFill>
+                <a:latin typeface="Consolas" panose="020B0609020204030204" pitchFamily="49" charset="0"/>
+              </a:rPr>
+              <a:t>  </a:t>
+            </a:r>
+            <a:r>
+              <a:rPr lang="de-DE" i="1" dirty="0" err="1" smtClean="0">
+                <a:solidFill>
+                  <a:srgbClr val="0000C0"/>
+                </a:solidFill>
+                <a:latin typeface="Consolas" panose="020B0609020204030204" pitchFamily="49" charset="0"/>
+              </a:rPr>
+              <a:t>QA</a:t>
+            </a:r>
+            <a:r>
+              <a:rPr lang="de-DE" dirty="0" err="1" smtClean="0">
+                <a:solidFill>
+                  <a:srgbClr val="000000"/>
+                </a:solidFill>
+                <a:latin typeface="Consolas" panose="020B0609020204030204" pitchFamily="49" charset="0"/>
+              </a:rPr>
+              <a:t>.hasMembers</a:t>
+            </a:r>
+            <a:r>
+              <a:rPr lang="de-DE" dirty="0" smtClean="0">
+                <a:solidFill>
+                  <a:srgbClr val="000000"/>
+                </a:solidFill>
+                <a:latin typeface="Consolas" panose="020B0609020204030204" pitchFamily="49" charset="0"/>
+              </a:rPr>
+              <a:t>(</a:t>
+            </a:r>
+            <a:r>
+              <a:rPr lang="de-DE" i="1" dirty="0" smtClean="0">
+                <a:solidFill>
+                  <a:srgbClr val="0000C0"/>
+                </a:solidFill>
+                <a:latin typeface="Consolas" panose="020B0609020204030204" pitchFamily="49" charset="0"/>
+              </a:rPr>
+              <a:t>KAULBERSCH</a:t>
+            </a:r>
+            <a:r>
+              <a:rPr lang="de-DE" dirty="0" smtClean="0">
+                <a:solidFill>
+                  <a:srgbClr val="000000"/>
+                </a:solidFill>
+                <a:latin typeface="Consolas" panose="020B0609020204030204" pitchFamily="49" charset="0"/>
+              </a:rPr>
+              <a:t>,</a:t>
+            </a:r>
+            <a:r>
+              <a:rPr lang="de-DE" i="1" dirty="0" smtClean="0">
+                <a:solidFill>
+                  <a:srgbClr val="0000C0"/>
+                </a:solidFill>
+                <a:latin typeface="Consolas" panose="020B0609020204030204" pitchFamily="49" charset="0"/>
+              </a:rPr>
+              <a:t> GUITTON</a:t>
+            </a:r>
+            <a:r>
+              <a:rPr lang="de-DE" dirty="0" smtClean="0">
+                <a:solidFill>
+                  <a:srgbClr val="000000"/>
+                </a:solidFill>
+                <a:latin typeface="Consolas" panose="020B0609020204030204" pitchFamily="49" charset="0"/>
+              </a:rPr>
+              <a:t>,</a:t>
+            </a:r>
+            <a:r>
+              <a:rPr lang="de-DE" i="1" dirty="0" smtClean="0">
+                <a:solidFill>
+                  <a:srgbClr val="0000C0"/>
+                </a:solidFill>
+                <a:latin typeface="Consolas" panose="020B0609020204030204" pitchFamily="49" charset="0"/>
+              </a:rPr>
+              <a:t> </a:t>
+            </a:r>
+            <a:r>
+              <a:rPr lang="de-DE" i="1" dirty="0">
+                <a:solidFill>
+                  <a:srgbClr val="0000C0"/>
+                </a:solidFill>
+                <a:latin typeface="Consolas" panose="020B0609020204030204" pitchFamily="49" charset="0"/>
+              </a:rPr>
+              <a:t>BARANOWSKI</a:t>
+            </a:r>
+            <a:r>
+              <a:rPr lang="de-DE" dirty="0" smtClean="0">
+                <a:solidFill>
+                  <a:srgbClr val="000000"/>
+                </a:solidFill>
+                <a:latin typeface="Consolas" panose="020B0609020204030204" pitchFamily="49" charset="0"/>
+              </a:rPr>
+              <a:t>)</a:t>
+            </a:r>
+          </a:p>
+          <a:p>
+            <a:r>
+              <a:rPr lang="de-DE" dirty="0">
+                <a:solidFill>
+                  <a:srgbClr val="000000"/>
+                </a:solidFill>
+                <a:latin typeface="Consolas" panose="020B0609020204030204" pitchFamily="49" charset="0"/>
+              </a:rPr>
+              <a:t> </a:t>
+            </a:r>
+            <a:r>
+              <a:rPr lang="de-DE" dirty="0" smtClean="0">
+                <a:solidFill>
                   <a:srgbClr val="2A00FF"/>
                 </a:solidFill>
                 <a:latin typeface="Consolas" panose="020B0609020204030204" pitchFamily="49" charset="0"/>
               </a:rPr>
-              <a:t>def</a:t>
-            </a:r>
-            <a:r>
-              <a:rPr lang="de-DE" dirty="0">
-                <a:solidFill>
-                  <a:srgbClr val="2A00FF"/>
-                </a:solidFill>
-                <a:latin typeface="Consolas" panose="020B0609020204030204" pitchFamily="49" charset="0"/>
-              </a:rPr>
               <a:t> </a:t>
             </a:r>
             <a:r>
+              <a:rPr lang="de-DE" i="1" dirty="0" err="1" smtClean="0">
+                <a:solidFill>
+                  <a:srgbClr val="0000C0"/>
+                </a:solidFill>
+                <a:latin typeface="Consolas" panose="020B0609020204030204" pitchFamily="49" charset="0"/>
+              </a:rPr>
+              <a:t>KAULBERSCH</a:t>
+            </a:r>
+            <a:r>
+              <a:rPr lang="de-DE" dirty="0" err="1" smtClean="0">
+                <a:solidFill>
+                  <a:srgbClr val="000000"/>
+                </a:solidFill>
+                <a:latin typeface="Consolas" panose="020B0609020204030204" pitchFamily="49" charset="0"/>
+              </a:rPr>
+              <a:t>.worksAs</a:t>
+            </a:r>
+            <a:r>
+              <a:rPr lang="de-DE" dirty="0" smtClean="0">
+                <a:solidFill>
+                  <a:srgbClr val="000000"/>
+                </a:solidFill>
+                <a:latin typeface="Consolas" panose="020B0609020204030204" pitchFamily="49" charset="0"/>
+              </a:rPr>
+              <a:t>(</a:t>
+            </a:r>
+            <a:r>
+              <a:rPr lang="de-DE" i="1" dirty="0">
+                <a:solidFill>
+                  <a:srgbClr val="0000C0"/>
+                </a:solidFill>
+                <a:latin typeface="Consolas" panose="020B0609020204030204" pitchFamily="49" charset="0"/>
+              </a:rPr>
+              <a:t>SWD</a:t>
+            </a:r>
+            <a:r>
+              <a:rPr lang="de-DE" dirty="0">
+                <a:solidFill>
+                  <a:srgbClr val="000000"/>
+                </a:solidFill>
+                <a:latin typeface="Consolas" panose="020B0609020204030204" pitchFamily="49" charset="0"/>
+              </a:rPr>
+              <a:t>).</a:t>
+            </a:r>
+            <a:r>
               <a:rPr lang="de-DE" dirty="0" err="1">
                 <a:solidFill>
-                  <a:srgbClr val="2A00FF"/>
-                </a:solidFill>
-                <a:latin typeface="Consolas" panose="020B0609020204030204" pitchFamily="49" charset="0"/>
-              </a:rPr>
-              <a:t>relations</a:t>
-            </a:r>
-            <a:r>
-              <a:rPr lang="de-DE" dirty="0">
-                <a:solidFill>
-                  <a:srgbClr val="2A00FF"/>
-                </a:solidFill>
-                <a:latin typeface="Consolas" panose="020B0609020204030204" pitchFamily="49" charset="0"/>
-              </a:rPr>
-              <a:t>() {</a:t>
-            </a:r>
-          </a:p>
-          <a:p>
-            <a:r>
-              <a:rPr lang="de-DE" dirty="0">
-                <a:solidFill>
-                  <a:srgbClr val="2A00FF"/>
+                  <a:srgbClr val="000000"/>
+                </a:solidFill>
+                <a:latin typeface="Consolas" panose="020B0609020204030204" pitchFamily="49" charset="0"/>
+              </a:rPr>
+              <a:t>engagementStart</a:t>
+            </a:r>
+            <a:r>
+              <a:rPr lang="de-DE" dirty="0">
+                <a:solidFill>
+                  <a:srgbClr val="000000"/>
+                </a:solidFill>
+                <a:latin typeface="Consolas" panose="020B0609020204030204" pitchFamily="49" charset="0"/>
+              </a:rPr>
+              <a:t>(</a:t>
+            </a:r>
+            <a:r>
+              <a:rPr lang="de-DE" dirty="0">
+                <a:solidFill>
+                  <a:srgbClr val="FF00CC"/>
+                </a:solidFill>
+                <a:latin typeface="Consolas" panose="020B0609020204030204" pitchFamily="49" charset="0"/>
+              </a:rPr>
+              <a:t>"01.04.2013"</a:t>
+            </a:r>
+            <a:r>
+              <a:rPr lang="de-DE" dirty="0" smtClean="0">
+                <a:solidFill>
+                  <a:srgbClr val="000000"/>
+                </a:solidFill>
+                <a:latin typeface="Consolas" panose="020B0609020204030204" pitchFamily="49" charset="0"/>
+              </a:rPr>
+              <a:t>)</a:t>
+            </a:r>
+          </a:p>
+          <a:p>
+            <a:r>
+              <a:rPr lang="de-DE" i="1" dirty="0">
+                <a:solidFill>
+                  <a:srgbClr val="000000"/>
+                </a:solidFill>
+                <a:latin typeface="Consolas" panose="020B0609020204030204" pitchFamily="49" charset="0"/>
+              </a:rPr>
+              <a:t> </a:t>
+            </a:r>
+            <a:r>
+              <a:rPr lang="de-DE" i="1" dirty="0" smtClean="0">
+                <a:solidFill>
+                  <a:srgbClr val="000000"/>
+                </a:solidFill>
+                <a:latin typeface="Consolas" panose="020B0609020204030204" pitchFamily="49" charset="0"/>
+              </a:rPr>
+              <a:t> </a:t>
+            </a:r>
+            <a:r>
+              <a:rPr lang="de-DE" i="1" dirty="0" err="1" smtClean="0">
+                <a:solidFill>
+                  <a:srgbClr val="0000C0"/>
+                </a:solidFill>
+                <a:latin typeface="Consolas" panose="020B0609020204030204" pitchFamily="49" charset="0"/>
+              </a:rPr>
+              <a:t>GUITTON</a:t>
+            </a:r>
+            <a:r>
+              <a:rPr lang="de-DE" dirty="0" err="1" smtClean="0">
+                <a:solidFill>
+                  <a:srgbClr val="000000"/>
+                </a:solidFill>
+                <a:latin typeface="Consolas" panose="020B0609020204030204" pitchFamily="49" charset="0"/>
+              </a:rPr>
+              <a:t>.worksAs</a:t>
+            </a:r>
+            <a:r>
+              <a:rPr lang="de-DE" dirty="0" smtClean="0">
+                <a:solidFill>
+                  <a:srgbClr val="000000"/>
+                </a:solidFill>
+                <a:latin typeface="Consolas" panose="020B0609020204030204" pitchFamily="49" charset="0"/>
+              </a:rPr>
+              <a:t>(</a:t>
+            </a:r>
+            <a:r>
+              <a:rPr lang="de-DE" i="1" dirty="0" smtClean="0">
+                <a:solidFill>
+                  <a:srgbClr val="0000C0"/>
+                </a:solidFill>
+                <a:latin typeface="Consolas" panose="020B0609020204030204" pitchFamily="49" charset="0"/>
+              </a:rPr>
+              <a:t>SWT</a:t>
+            </a:r>
+            <a:r>
+              <a:rPr lang="de-DE" dirty="0" smtClean="0">
+                <a:solidFill>
+                  <a:srgbClr val="000000"/>
+                </a:solidFill>
+                <a:latin typeface="Consolas" panose="020B0609020204030204" pitchFamily="49" charset="0"/>
+              </a:rPr>
+              <a:t>)</a:t>
+            </a:r>
+          </a:p>
+          <a:p>
+            <a:r>
+              <a:rPr lang="de-DE" dirty="0" smtClean="0">
+                <a:solidFill>
+                  <a:srgbClr val="000000"/>
                 </a:solidFill>
                 <a:latin typeface="Consolas" panose="020B0609020204030204" pitchFamily="49" charset="0"/>
               </a:rPr>
               <a:t>  </a:t>
             </a:r>
             <a:r>
-              <a:rPr lang="de-DE" dirty="0" err="1">
-                <a:solidFill>
-                  <a:srgbClr val="2A00FF"/>
-                </a:solidFill>
-                <a:latin typeface="Consolas" panose="020B0609020204030204" pitchFamily="49" charset="0"/>
-              </a:rPr>
-              <a:t>QA.hasMembers</a:t>
-            </a:r>
-            <a:r>
-              <a:rPr lang="de-DE" dirty="0">
-                <a:solidFill>
-                  <a:srgbClr val="2A00FF"/>
-                </a:solidFill>
-                <a:latin typeface="Consolas" panose="020B0609020204030204" pitchFamily="49" charset="0"/>
-              </a:rPr>
-              <a:t>(KAULBERSCH, GUITTON, BARANOWSKI</a:t>
-            </a:r>
-            <a:r>
-              <a:rPr lang="de-DE" dirty="0">
-                <a:solidFill>
-                  <a:srgbClr val="2A00FF"/>
+              <a:rPr lang="de-DE" i="1" dirty="0" err="1" smtClean="0">
+                <a:solidFill>
+                  <a:srgbClr val="0000C0"/>
+                </a:solidFill>
+                <a:latin typeface="Consolas" panose="020B0609020204030204" pitchFamily="49" charset="0"/>
+              </a:rPr>
+              <a:t>BARANOWSKI</a:t>
+            </a:r>
+            <a:r>
+              <a:rPr lang="de-DE" dirty="0" err="1" smtClean="0">
+                <a:solidFill>
+                  <a:srgbClr val="000000"/>
+                </a:solidFill>
+                <a:latin typeface="Consolas" panose="020B0609020204030204" pitchFamily="49" charset="0"/>
+              </a:rPr>
+              <a:t>.worksAs</a:t>
+            </a:r>
+            <a:r>
+              <a:rPr lang="de-DE" dirty="0" smtClean="0">
+                <a:solidFill>
+                  <a:srgbClr val="000000"/>
+                </a:solidFill>
+                <a:latin typeface="Consolas" panose="020B0609020204030204" pitchFamily="49" charset="0"/>
+              </a:rPr>
+              <a:t>(</a:t>
+            </a:r>
+            <a:r>
+              <a:rPr lang="de-DE" i="1" dirty="0" smtClean="0">
+                <a:solidFill>
+                  <a:srgbClr val="0000C0"/>
+                </a:solidFill>
+                <a:latin typeface="Consolas" panose="020B0609020204030204" pitchFamily="49" charset="0"/>
+              </a:rPr>
+              <a:t>TM</a:t>
+            </a:r>
+            <a:r>
+              <a:rPr lang="de-DE" dirty="0" smtClean="0">
+                <a:solidFill>
+                  <a:srgbClr val="000000"/>
                 </a:solidFill>
                 <a:latin typeface="Consolas" panose="020B0609020204030204" pitchFamily="49" charset="0"/>
               </a:rPr>
               <a:t>)</a:t>
-            </a:r>
-          </a:p>
-          <a:p>
-            <a:r>
-              <a:rPr lang="de-DE" dirty="0">
-                <a:solidFill>
-                  <a:srgbClr val="2A00FF"/>
-                </a:solidFill>
-                <a:latin typeface="Consolas" panose="020B0609020204030204" pitchFamily="49" charset="0"/>
-              </a:rPr>
-              <a:t>  </a:t>
-            </a:r>
-            <a:r>
-              <a:rPr lang="de-DE" dirty="0" err="1">
-                <a:solidFill>
-                  <a:srgbClr val="2A00FF"/>
-                </a:solidFill>
-                <a:latin typeface="Consolas" panose="020B0609020204030204" pitchFamily="49" charset="0"/>
-              </a:rPr>
-              <a:t>KAULBERSCH</a:t>
-            </a:r>
-            <a:r>
-              <a:rPr lang="de-DE" dirty="0" err="1">
-                <a:solidFill>
-                  <a:srgbClr val="2A00FF"/>
-                </a:solidFill>
-                <a:latin typeface="Consolas" panose="020B0609020204030204" pitchFamily="49" charset="0"/>
-              </a:rPr>
-              <a:t>.worksAs</a:t>
-            </a:r>
-            <a:r>
-              <a:rPr lang="de-DE" dirty="0">
-                <a:solidFill>
-                  <a:srgbClr val="2A00FF"/>
-                </a:solidFill>
-                <a:latin typeface="Consolas" panose="020B0609020204030204" pitchFamily="49" charset="0"/>
-              </a:rPr>
-              <a:t>(</a:t>
-            </a:r>
-            <a:r>
-              <a:rPr lang="de-DE" dirty="0">
-                <a:solidFill>
-                  <a:srgbClr val="2A00FF"/>
-                </a:solidFill>
-                <a:latin typeface="Consolas" panose="020B0609020204030204" pitchFamily="49" charset="0"/>
-              </a:rPr>
-              <a:t>SWD</a:t>
-            </a:r>
-            <a:r>
-              <a:rPr lang="de-DE" dirty="0">
-                <a:solidFill>
-                  <a:srgbClr val="2A00FF"/>
-                </a:solidFill>
-                <a:latin typeface="Consolas" panose="020B0609020204030204" pitchFamily="49" charset="0"/>
-              </a:rPr>
-              <a:t>)</a:t>
-            </a:r>
-            <a:r>
-              <a:rPr lang="de-DE" dirty="0">
-                <a:solidFill>
-                  <a:srgbClr val="2A00FF"/>
-                </a:solidFill>
-                <a:latin typeface="Consolas" panose="020B0609020204030204" pitchFamily="49" charset="0"/>
-              </a:rPr>
-              <a:t>.</a:t>
-            </a:r>
-            <a:r>
-              <a:rPr lang="de-DE" dirty="0" err="1">
-                <a:solidFill>
-                  <a:srgbClr val="2A00FF"/>
-                </a:solidFill>
-                <a:latin typeface="Consolas" panose="020B0609020204030204" pitchFamily="49" charset="0"/>
-              </a:rPr>
-              <a:t>engagementStart</a:t>
-            </a:r>
-            <a:r>
-              <a:rPr lang="de-DE" dirty="0">
-                <a:solidFill>
-                  <a:srgbClr val="2A00FF"/>
-                </a:solidFill>
-                <a:latin typeface="Consolas" panose="020B0609020204030204" pitchFamily="49" charset="0"/>
-              </a:rPr>
-              <a:t>(</a:t>
-            </a:r>
-            <a:r>
-              <a:rPr lang="de-DE" dirty="0">
-                <a:solidFill>
-                  <a:srgbClr val="2A00FF"/>
-                </a:solidFill>
-                <a:latin typeface="Consolas" panose="020B0609020204030204" pitchFamily="49" charset="0"/>
-              </a:rPr>
-              <a:t>"</a:t>
-            </a:r>
-            <a:r>
-              <a:rPr lang="de-DE" dirty="0">
-                <a:solidFill>
-                  <a:srgbClr val="2A00FF"/>
-                </a:solidFill>
-                <a:latin typeface="Consolas" panose="020B0609020204030204" pitchFamily="49" charset="0"/>
-              </a:rPr>
-              <a:t>01.04.2013")</a:t>
             </a:r>
             <a:endParaRPr lang="de-DE" dirty="0">
               <a:solidFill>
-                <a:srgbClr val="2A00FF"/>
+                <a:srgbClr val="000000"/>
               </a:solidFill>
               <a:latin typeface="Consolas" panose="020B0609020204030204" pitchFamily="49" charset="0"/>
             </a:endParaRPr>
           </a:p>
           <a:p>
             <a:r>
-              <a:rPr lang="de-DE" dirty="0">
-                <a:solidFill>
-                  <a:srgbClr val="2A00FF"/>
-                </a:solidFill>
-                <a:latin typeface="Consolas" panose="020B0609020204030204" pitchFamily="49" charset="0"/>
-              </a:rPr>
-              <a:t>  </a:t>
-            </a:r>
-            <a:r>
-              <a:rPr lang="de-DE" dirty="0" err="1">
-                <a:solidFill>
-                  <a:srgbClr val="2A00FF"/>
-                </a:solidFill>
-                <a:latin typeface="Consolas" panose="020B0609020204030204" pitchFamily="49" charset="0"/>
-              </a:rPr>
-              <a:t>GUITTON</a:t>
-            </a:r>
-            <a:r>
-              <a:rPr lang="de-DE" dirty="0" err="1">
-                <a:solidFill>
-                  <a:srgbClr val="2A00FF"/>
-                </a:solidFill>
-                <a:latin typeface="Consolas" panose="020B0609020204030204" pitchFamily="49" charset="0"/>
-              </a:rPr>
-              <a:t>.worksAs</a:t>
-            </a:r>
-            <a:r>
-              <a:rPr lang="de-DE" dirty="0">
-                <a:solidFill>
-                  <a:srgbClr val="2A00FF"/>
-                </a:solidFill>
-                <a:latin typeface="Consolas" panose="020B0609020204030204" pitchFamily="49" charset="0"/>
-              </a:rPr>
-              <a:t>(</a:t>
-            </a:r>
-            <a:r>
-              <a:rPr lang="de-DE" dirty="0">
-                <a:solidFill>
-                  <a:srgbClr val="2A00FF"/>
-                </a:solidFill>
-                <a:latin typeface="Consolas" panose="020B0609020204030204" pitchFamily="49" charset="0"/>
-              </a:rPr>
-              <a:t>SWT</a:t>
-            </a:r>
-            <a:r>
-              <a:rPr lang="de-DE" dirty="0">
-                <a:solidFill>
-                  <a:srgbClr val="2A00FF"/>
-                </a:solidFill>
-                <a:latin typeface="Consolas" panose="020B0609020204030204" pitchFamily="49" charset="0"/>
-              </a:rPr>
-              <a:t>)</a:t>
-            </a:r>
-          </a:p>
-          <a:p>
-            <a:r>
-              <a:rPr lang="de-DE" dirty="0">
-                <a:solidFill>
-                  <a:srgbClr val="2A00FF"/>
-                </a:solidFill>
-                <a:latin typeface="Consolas" panose="020B0609020204030204" pitchFamily="49" charset="0"/>
-              </a:rPr>
-              <a:t>  </a:t>
-            </a:r>
-            <a:r>
-              <a:rPr lang="de-DE" dirty="0" err="1">
-                <a:solidFill>
-                  <a:srgbClr val="2A00FF"/>
-                </a:solidFill>
-                <a:latin typeface="Consolas" panose="020B0609020204030204" pitchFamily="49" charset="0"/>
-              </a:rPr>
-              <a:t>BARANOWSKI</a:t>
-            </a:r>
-            <a:r>
-              <a:rPr lang="de-DE" dirty="0" err="1">
-                <a:solidFill>
-                  <a:srgbClr val="2A00FF"/>
-                </a:solidFill>
-                <a:latin typeface="Consolas" panose="020B0609020204030204" pitchFamily="49" charset="0"/>
-              </a:rPr>
-              <a:t>.worksAs</a:t>
-            </a:r>
-            <a:r>
-              <a:rPr lang="de-DE" dirty="0">
-                <a:solidFill>
-                  <a:srgbClr val="2A00FF"/>
-                </a:solidFill>
-                <a:latin typeface="Consolas" panose="020B0609020204030204" pitchFamily="49" charset="0"/>
-              </a:rPr>
-              <a:t>(</a:t>
-            </a:r>
-            <a:r>
-              <a:rPr lang="de-DE" dirty="0">
-                <a:solidFill>
-                  <a:srgbClr val="2A00FF"/>
-                </a:solidFill>
-                <a:latin typeface="Consolas" panose="020B0609020204030204" pitchFamily="49" charset="0"/>
-              </a:rPr>
-              <a:t>TM</a:t>
-            </a:r>
-            <a:r>
-              <a:rPr lang="de-DE" dirty="0">
-                <a:solidFill>
-                  <a:srgbClr val="2A00FF"/>
-                </a:solidFill>
-                <a:latin typeface="Consolas" panose="020B0609020204030204" pitchFamily="49" charset="0"/>
-              </a:rPr>
-              <a:t>)</a:t>
-            </a:r>
-          </a:p>
-          <a:p>
-            <a:r>
-              <a:rPr lang="de-DE" dirty="0">
-                <a:solidFill>
-                  <a:srgbClr val="2A00FF"/>
+              <a:rPr lang="de-DE" dirty="0" smtClean="0">
+                <a:solidFill>
+                  <a:srgbClr val="000000"/>
                 </a:solidFill>
                 <a:latin typeface="Consolas" panose="020B0609020204030204" pitchFamily="49" charset="0"/>
               </a:rPr>
@@ -9861,7 +9915,6 @@
               <a:rPr lang="de-DE" dirty="0" smtClean="0"/>
               <a:t>:</a:t>
             </a:r>
-            <a:endParaRPr lang="de-DE" dirty="0" smtClean="0"/>
           </a:p>
         </p:txBody>
       </p:sp>
@@ -9925,72 +9978,278 @@
             <a:r>
               <a:rPr lang="de-DE" dirty="0">
                 <a:solidFill>
+                  <a:srgbClr val="464646"/>
+                </a:solidFill>
+                <a:latin typeface="Consolas" panose="020B0609020204030204" pitchFamily="49" charset="0"/>
+              </a:rPr>
+              <a:t>@Test</a:t>
+            </a:r>
+          </a:p>
+          <a:p>
+            <a:r>
+              <a:rPr lang="de-DE" dirty="0">
+                <a:solidFill>
+                  <a:srgbClr val="464646"/>
+                </a:solidFill>
+                <a:latin typeface="Consolas" panose="020B0609020204030204" pitchFamily="49" charset="0"/>
+              </a:rPr>
+              <a:t>@</a:t>
+            </a:r>
+            <a:r>
+              <a:rPr lang="de-DE" dirty="0" err="1">
+                <a:solidFill>
+                  <a:srgbClr val="464646"/>
+                </a:solidFill>
+                <a:latin typeface="Consolas" panose="020B0609020204030204" pitchFamily="49" charset="0"/>
+              </a:rPr>
+              <a:t>DatabaseSetup</a:t>
+            </a:r>
+            <a:r>
+              <a:rPr lang="de-DE" dirty="0">
+                <a:solidFill>
+                  <a:srgbClr val="000000"/>
+                </a:solidFill>
+                <a:latin typeface="Consolas" panose="020B0609020204030204" pitchFamily="49" charset="0"/>
+              </a:rPr>
+              <a:t>(</a:t>
+            </a:r>
+            <a:r>
+              <a:rPr lang="de-DE" dirty="0" err="1">
+                <a:solidFill>
+                  <a:srgbClr val="000000"/>
+                </a:solidFill>
+                <a:latin typeface="Consolas" panose="020B0609020204030204" pitchFamily="49" charset="0"/>
+              </a:rPr>
+              <a:t>prepare</a:t>
+            </a:r>
+            <a:r>
+              <a:rPr lang="de-DE" dirty="0">
+                <a:solidFill>
+                  <a:srgbClr val="000000"/>
+                </a:solidFill>
+                <a:latin typeface="Consolas" panose="020B0609020204030204" pitchFamily="49" charset="0"/>
+              </a:rPr>
+              <a:t> = </a:t>
+            </a:r>
+            <a:r>
+              <a:rPr lang="de-DE" dirty="0" err="1">
+                <a:solidFill>
+                  <a:srgbClr val="000000"/>
+                </a:solidFill>
+                <a:latin typeface="Consolas" panose="020B0609020204030204" pitchFamily="49" charset="0"/>
+              </a:rPr>
+              <a:t>DemoGroovyDataSet</a:t>
+            </a:r>
+            <a:r>
+              <a:rPr lang="de-DE" dirty="0">
+                <a:solidFill>
+                  <a:srgbClr val="000000"/>
+                </a:solidFill>
+                <a:latin typeface="Consolas" panose="020B0609020204030204" pitchFamily="49" charset="0"/>
+              </a:rPr>
+              <a:t>)</a:t>
+            </a:r>
+          </a:p>
+          <a:p>
+            <a:r>
+              <a:rPr lang="de-DE" b="1" dirty="0" err="1">
+                <a:solidFill>
+                  <a:srgbClr val="972C78"/>
+                </a:solidFill>
+                <a:latin typeface="Consolas" panose="020B0609020204030204" pitchFamily="49" charset="0"/>
+              </a:rPr>
+              <a:t>void</a:t>
+            </a:r>
+            <a:r>
+              <a:rPr lang="de-DE" dirty="0" smtClean="0">
+                <a:solidFill>
                   <a:srgbClr val="2A00FF"/>
                 </a:solidFill>
                 <a:latin typeface="Consolas" panose="020B0609020204030204" pitchFamily="49" charset="0"/>
               </a:rPr>
-              <a:t>@Test</a:t>
-            </a:r>
-          </a:p>
-          <a:p>
-            <a:r>
-              <a:rPr lang="de-DE" dirty="0">
-                <a:solidFill>
-                  <a:srgbClr val="2A00FF"/>
-                </a:solidFill>
-                <a:latin typeface="Consolas" panose="020B0609020204030204" pitchFamily="49" charset="0"/>
-              </a:rPr>
-              <a:t>@</a:t>
+              <a:t> </a:t>
             </a:r>
             <a:r>
               <a:rPr lang="de-DE" dirty="0" err="1">
                 <a:solidFill>
-                  <a:srgbClr val="2A00FF"/>
-                </a:solidFill>
-                <a:latin typeface="Consolas" panose="020B0609020204030204" pitchFamily="49" charset="0"/>
-              </a:rPr>
-              <a:t>DatabaseSetup</a:t>
-            </a:r>
-            <a:r>
-              <a:rPr lang="de-DE" dirty="0">
-                <a:solidFill>
-                  <a:srgbClr val="2A00FF"/>
+                  <a:srgbClr val="000000"/>
+                </a:solidFill>
+                <a:latin typeface="Consolas" panose="020B0609020204030204" pitchFamily="49" charset="0"/>
+              </a:rPr>
+              <a:t>findPersonsForTeam</a:t>
+            </a:r>
+            <a:r>
+              <a:rPr lang="de-DE" dirty="0">
+                <a:solidFill>
+                  <a:srgbClr val="000000"/>
+                </a:solidFill>
+                <a:latin typeface="Consolas" panose="020B0609020204030204" pitchFamily="49" charset="0"/>
+              </a:rPr>
+              <a:t>() {</a:t>
+            </a:r>
+          </a:p>
+          <a:p>
+            <a:r>
+              <a:rPr lang="de-DE" dirty="0" smtClean="0">
+                <a:solidFill>
+                  <a:srgbClr val="000000"/>
+                </a:solidFill>
+                <a:latin typeface="Consolas" panose="020B0609020204030204" pitchFamily="49" charset="0"/>
+              </a:rPr>
+              <a:t>  Team </a:t>
+            </a:r>
+            <a:r>
+              <a:rPr lang="de-DE" dirty="0" err="1">
+                <a:solidFill>
+                  <a:srgbClr val="000000"/>
+                </a:solidFill>
+                <a:latin typeface="Consolas" panose="020B0609020204030204" pitchFamily="49" charset="0"/>
+              </a:rPr>
+              <a:t>team</a:t>
+            </a:r>
+            <a:r>
+              <a:rPr lang="de-DE" dirty="0">
+                <a:solidFill>
+                  <a:srgbClr val="000000"/>
+                </a:solidFill>
+                <a:latin typeface="Consolas" panose="020B0609020204030204" pitchFamily="49" charset="0"/>
+              </a:rPr>
+              <a:t> = </a:t>
+            </a:r>
+            <a:r>
+              <a:rPr lang="de-DE" b="1" dirty="0" err="1">
+                <a:solidFill>
+                  <a:srgbClr val="972C78"/>
+                </a:solidFill>
+                <a:latin typeface="Consolas" panose="020B0609020204030204" pitchFamily="49" charset="0"/>
+              </a:rPr>
+              <a:t>new</a:t>
+            </a:r>
+            <a:r>
+              <a:rPr lang="de-DE" dirty="0">
+                <a:solidFill>
+                  <a:srgbClr val="000000"/>
+                </a:solidFill>
+                <a:latin typeface="Consolas" panose="020B0609020204030204" pitchFamily="49" charset="0"/>
+              </a:rPr>
+              <a:t> Team</a:t>
+            </a:r>
+            <a:r>
+              <a:rPr lang="de-DE" dirty="0" smtClean="0">
+                <a:solidFill>
+                  <a:srgbClr val="000000"/>
+                </a:solidFill>
+                <a:latin typeface="Consolas" panose="020B0609020204030204" pitchFamily="49" charset="0"/>
+              </a:rPr>
+              <a:t>()</a:t>
+            </a:r>
+          </a:p>
+          <a:p>
+            <a:r>
+              <a:rPr lang="de-DE" dirty="0" smtClean="0">
+                <a:solidFill>
+                  <a:srgbClr val="000000"/>
+                </a:solidFill>
+                <a:latin typeface="Consolas" panose="020B0609020204030204" pitchFamily="49" charset="0"/>
+              </a:rPr>
+              <a:t>  </a:t>
+            </a:r>
+            <a:r>
+              <a:rPr lang="de-DE" dirty="0" err="1">
+                <a:solidFill>
+                  <a:srgbClr val="000000"/>
+                </a:solidFill>
+                <a:latin typeface="Consolas" panose="020B0609020204030204" pitchFamily="49" charset="0"/>
+              </a:rPr>
+              <a:t>team.setId</a:t>
+            </a:r>
+            <a:r>
+              <a:rPr lang="de-DE" dirty="0">
+                <a:solidFill>
+                  <a:srgbClr val="000000"/>
                 </a:solidFill>
                 <a:latin typeface="Consolas" panose="020B0609020204030204" pitchFamily="49" charset="0"/>
               </a:rPr>
               <a:t>(</a:t>
             </a:r>
             <a:r>
+              <a:rPr lang="de-DE" i="1" dirty="0">
+                <a:solidFill>
+                  <a:srgbClr val="0000C0"/>
+                </a:solidFill>
+                <a:latin typeface="Consolas" panose="020B0609020204030204" pitchFamily="49" charset="0"/>
+              </a:rPr>
+              <a:t>QA</a:t>
+            </a:r>
+            <a:r>
+              <a:rPr lang="de-DE" dirty="0">
+                <a:solidFill>
+                  <a:srgbClr val="000000"/>
+                </a:solidFill>
+                <a:latin typeface="Consolas" panose="020B0609020204030204" pitchFamily="49" charset="0"/>
+              </a:rPr>
+              <a:t>.id)</a:t>
+            </a:r>
+          </a:p>
+          <a:p>
+            <a:r>
+              <a:rPr lang="de-DE" dirty="0">
+                <a:solidFill>
+                  <a:srgbClr val="000000"/>
+                </a:solidFill>
+                <a:latin typeface="Consolas" panose="020B0609020204030204" pitchFamily="49" charset="0"/>
+              </a:rPr>
+              <a:t> </a:t>
+            </a:r>
+            <a:r>
+              <a:rPr lang="de-DE" dirty="0" smtClean="0">
+                <a:solidFill>
+                  <a:srgbClr val="000000"/>
+                </a:solidFill>
+                <a:latin typeface="Consolas" panose="020B0609020204030204" pitchFamily="49" charset="0"/>
+              </a:rPr>
+              <a:t> </a:t>
+            </a:r>
+            <a:r>
               <a:rPr lang="de-DE" dirty="0" err="1">
                 <a:solidFill>
-                  <a:srgbClr val="2A00FF"/>
-                </a:solidFill>
-                <a:latin typeface="Consolas" panose="020B0609020204030204" pitchFamily="49" charset="0"/>
-              </a:rPr>
-              <a:t>prepare</a:t>
-            </a:r>
-            <a:r>
-              <a:rPr lang="de-DE" dirty="0">
-                <a:solidFill>
-                  <a:srgbClr val="2A00FF"/>
-                </a:solidFill>
-                <a:latin typeface="Consolas" panose="020B0609020204030204" pitchFamily="49" charset="0"/>
-              </a:rPr>
-              <a:t> = </a:t>
+                  <a:srgbClr val="000000"/>
+                </a:solidFill>
+                <a:latin typeface="Consolas" panose="020B0609020204030204" pitchFamily="49" charset="0"/>
+              </a:rPr>
+              <a:t>team.setTitle</a:t>
+            </a:r>
+            <a:r>
+              <a:rPr lang="de-DE" dirty="0">
+                <a:solidFill>
+                  <a:srgbClr val="000000"/>
+                </a:solidFill>
+                <a:latin typeface="Consolas" panose="020B0609020204030204" pitchFamily="49" charset="0"/>
+              </a:rPr>
+              <a:t>(</a:t>
+            </a:r>
+            <a:r>
+              <a:rPr lang="de-DE" i="1" dirty="0" err="1">
+                <a:solidFill>
+                  <a:srgbClr val="0000C0"/>
+                </a:solidFill>
+                <a:latin typeface="Consolas" panose="020B0609020204030204" pitchFamily="49" charset="0"/>
+              </a:rPr>
+              <a:t>QA</a:t>
             </a:r>
             <a:r>
               <a:rPr lang="de-DE" dirty="0" err="1">
                 <a:solidFill>
-                  <a:srgbClr val="2A00FF"/>
-                </a:solidFill>
-                <a:latin typeface="Consolas" panose="020B0609020204030204" pitchFamily="49" charset="0"/>
-              </a:rPr>
-              <a:t>DemoGroovyDataSet</a:t>
-            </a:r>
-            <a:r>
-              <a:rPr lang="de-DE" dirty="0">
-                <a:solidFill>
-                  <a:srgbClr val="2A00FF"/>
+                  <a:srgbClr val="000000"/>
+                </a:solidFill>
+                <a:latin typeface="Consolas" panose="020B0609020204030204" pitchFamily="49" charset="0"/>
+              </a:rPr>
+              <a:t>.title</a:t>
+            </a:r>
+            <a:r>
+              <a:rPr lang="de-DE" dirty="0">
+                <a:solidFill>
+                  <a:srgbClr val="000000"/>
                 </a:solidFill>
                 <a:latin typeface="Consolas" panose="020B0609020204030204" pitchFamily="49" charset="0"/>
               </a:rPr>
@@ -9999,372 +10258,133 @@
           </a:p>
           <a:p>
             <a:r>
+              <a:rPr lang="de-DE" dirty="0">
+                <a:solidFill>
+                  <a:srgbClr val="000000"/>
+                </a:solidFill>
+                <a:latin typeface="Consolas" panose="020B0609020204030204" pitchFamily="49" charset="0"/>
+              </a:rPr>
+              <a:t> </a:t>
+            </a:r>
+            <a:r>
+              <a:rPr lang="de-DE" dirty="0" smtClean="0">
+                <a:solidFill>
+                  <a:srgbClr val="000000"/>
+                </a:solidFill>
+                <a:latin typeface="Consolas" panose="020B0609020204030204" pitchFamily="49" charset="0"/>
+              </a:rPr>
+              <a:t> </a:t>
+            </a:r>
+            <a:r>
               <a:rPr lang="de-DE" dirty="0" err="1">
                 <a:solidFill>
-                  <a:srgbClr val="2A00FF"/>
-                </a:solidFill>
-                <a:latin typeface="Consolas" panose="020B0609020204030204" pitchFamily="49" charset="0"/>
-              </a:rPr>
-              <a:t>void</a:t>
-            </a:r>
-            <a:r>
-              <a:rPr lang="de-DE" dirty="0">
-                <a:solidFill>
-                  <a:srgbClr val="2A00FF"/>
+                  <a:srgbClr val="000000"/>
+                </a:solidFill>
+                <a:latin typeface="Consolas" panose="020B0609020204030204" pitchFamily="49" charset="0"/>
+              </a:rPr>
+              <a:t>team.setDescription</a:t>
+            </a:r>
+            <a:r>
+              <a:rPr lang="de-DE" dirty="0">
+                <a:solidFill>
+                  <a:srgbClr val="000000"/>
+                </a:solidFill>
+                <a:latin typeface="Consolas" panose="020B0609020204030204" pitchFamily="49" charset="0"/>
+              </a:rPr>
+              <a:t>(</a:t>
+            </a:r>
+            <a:r>
+              <a:rPr lang="de-DE" i="1" dirty="0" err="1">
+                <a:solidFill>
+                  <a:srgbClr val="0000C0"/>
+                </a:solidFill>
+                <a:latin typeface="Consolas" panose="020B0609020204030204" pitchFamily="49" charset="0"/>
+              </a:rPr>
+              <a:t>QA</a:t>
+            </a:r>
+            <a:r>
+              <a:rPr lang="de-DE" dirty="0" err="1">
+                <a:solidFill>
+                  <a:srgbClr val="000000"/>
+                </a:solidFill>
+                <a:latin typeface="Consolas" panose="020B0609020204030204" pitchFamily="49" charset="0"/>
+              </a:rPr>
+              <a:t>.description</a:t>
+            </a:r>
+            <a:r>
+              <a:rPr lang="de-DE" dirty="0">
+                <a:solidFill>
+                  <a:srgbClr val="000000"/>
+                </a:solidFill>
+                <a:latin typeface="Consolas" panose="020B0609020204030204" pitchFamily="49" charset="0"/>
+              </a:rPr>
+              <a:t>)</a:t>
+            </a:r>
+          </a:p>
+          <a:p>
+            <a:r>
+              <a:rPr lang="de-DE" dirty="0">
+                <a:solidFill>
+                  <a:srgbClr val="000000"/>
                 </a:solidFill>
                 <a:latin typeface="Consolas" panose="020B0609020204030204" pitchFamily="49" charset="0"/>
               </a:rPr>
               <a:t> </a:t>
             </a:r>
             <a:r>
+              <a:rPr lang="de-DE" dirty="0" smtClean="0">
+                <a:solidFill>
+                  <a:srgbClr val="000000"/>
+                </a:solidFill>
+                <a:latin typeface="Consolas" panose="020B0609020204030204" pitchFamily="49" charset="0"/>
+              </a:rPr>
+              <a:t> </a:t>
+            </a:r>
+            <a:r>
               <a:rPr lang="de-DE" dirty="0" err="1">
                 <a:solidFill>
-                  <a:srgbClr val="2A00FF"/>
-                </a:solidFill>
-                <a:latin typeface="Consolas" panose="020B0609020204030204" pitchFamily="49" charset="0"/>
-              </a:rPr>
-              <a:t>findPersonsForTeam</a:t>
-            </a:r>
-            <a:r>
-              <a:rPr lang="de-DE" dirty="0">
-                <a:solidFill>
-                  <a:srgbClr val="2A00FF"/>
-                </a:solidFill>
-                <a:latin typeface="Consolas" panose="020B0609020204030204" pitchFamily="49" charset="0"/>
-              </a:rPr>
-              <a:t>() {</a:t>
-            </a:r>
-          </a:p>
-          <a:p>
-            <a:r>
-              <a:rPr lang="de-DE" dirty="0">
-                <a:solidFill>
-                  <a:srgbClr val="2A00FF"/>
-                </a:solidFill>
-                <a:latin typeface="Consolas" panose="020B0609020204030204" pitchFamily="49" charset="0"/>
-              </a:rPr>
-              <a:t>  Team </a:t>
+                  <a:srgbClr val="000000"/>
+                </a:solidFill>
+                <a:latin typeface="Consolas" panose="020B0609020204030204" pitchFamily="49" charset="0"/>
+              </a:rPr>
+              <a:t>team.setMembersize</a:t>
+            </a:r>
+            <a:r>
+              <a:rPr lang="de-DE" dirty="0">
+                <a:solidFill>
+                  <a:srgbClr val="000000"/>
+                </a:solidFill>
+                <a:latin typeface="Consolas" panose="020B0609020204030204" pitchFamily="49" charset="0"/>
+              </a:rPr>
+              <a:t>(</a:t>
+            </a:r>
+            <a:r>
+              <a:rPr lang="de-DE" i="1" dirty="0" err="1">
+                <a:solidFill>
+                  <a:srgbClr val="0000C0"/>
+                </a:solidFill>
+                <a:latin typeface="Consolas" panose="020B0609020204030204" pitchFamily="49" charset="0"/>
+              </a:rPr>
+              <a:t>QA</a:t>
             </a:r>
             <a:r>
               <a:rPr lang="de-DE" dirty="0" err="1">
                 <a:solidFill>
-                  <a:srgbClr val="2A00FF"/>
-                </a:solidFill>
-                <a:latin typeface="Consolas" panose="020B0609020204030204" pitchFamily="49" charset="0"/>
-              </a:rPr>
-              <a:t>team</a:t>
-            </a:r>
-            <a:r>
-              <a:rPr lang="de-DE" dirty="0">
-                <a:solidFill>
-                  <a:srgbClr val="2A00FF"/>
-                </a:solidFill>
-                <a:latin typeface="Consolas" panose="020B0609020204030204" pitchFamily="49" charset="0"/>
-              </a:rPr>
-              <a:t> = </a:t>
-            </a:r>
-            <a:r>
-              <a:rPr lang="de-DE" dirty="0" err="1">
-                <a:solidFill>
-                  <a:srgbClr val="2A00FF"/>
-                </a:solidFill>
-                <a:latin typeface="Consolas" panose="020B0609020204030204" pitchFamily="49" charset="0"/>
-              </a:rPr>
-              <a:t>new</a:t>
-            </a:r>
-            <a:r>
-              <a:rPr lang="de-DE" dirty="0">
-                <a:solidFill>
-                  <a:srgbClr val="2A00FF"/>
-                </a:solidFill>
-                <a:latin typeface="Consolas" panose="020B0609020204030204" pitchFamily="49" charset="0"/>
-              </a:rPr>
-              <a:t> Team()</a:t>
-            </a:r>
-          </a:p>
-          <a:p>
-            <a:r>
-              <a:rPr lang="de-DE" dirty="0">
-                <a:solidFill>
-                  <a:srgbClr val="2A00FF"/>
-                </a:solidFill>
-                <a:latin typeface="Consolas" panose="020B0609020204030204" pitchFamily="49" charset="0"/>
-              </a:rPr>
-              <a:t>  </a:t>
-            </a:r>
-            <a:r>
-              <a:rPr lang="de-DE" dirty="0" err="1">
-                <a:solidFill>
-                  <a:srgbClr val="2A00FF"/>
-                </a:solidFill>
-                <a:latin typeface="Consolas" panose="020B0609020204030204" pitchFamily="49" charset="0"/>
-              </a:rPr>
-              <a:t>team.setId</a:t>
-            </a:r>
-            <a:r>
-              <a:rPr lang="de-DE" dirty="0">
-                <a:solidFill>
-                  <a:srgbClr val="2A00FF"/>
-                </a:solidFill>
-                <a:latin typeface="Consolas" panose="020B0609020204030204" pitchFamily="49" charset="0"/>
-              </a:rPr>
-              <a:t>(QA</a:t>
-            </a:r>
-            <a:r>
-              <a:rPr lang="de-DE" dirty="0">
-                <a:solidFill>
-                  <a:srgbClr val="2A00FF"/>
-                </a:solidFill>
-                <a:latin typeface="Consolas" panose="020B0609020204030204" pitchFamily="49" charset="0"/>
-              </a:rPr>
-              <a:t>.id</a:t>
-            </a:r>
-            <a:r>
-              <a:rPr lang="de-DE" dirty="0">
-                <a:solidFill>
-                  <a:srgbClr val="2A00FF"/>
+                  <a:srgbClr val="000000"/>
+                </a:solidFill>
+                <a:latin typeface="Consolas" panose="020B0609020204030204" pitchFamily="49" charset="0"/>
+              </a:rPr>
+              <a:t>.membersize</a:t>
+            </a:r>
+            <a:r>
+              <a:rPr lang="de-DE" dirty="0" smtClean="0">
+                <a:solidFill>
+                  <a:srgbClr val="000000"/>
                 </a:solidFill>
                 <a:latin typeface="Consolas" panose="020B0609020204030204" pitchFamily="49" charset="0"/>
               </a:rPr>
               <a:t>)</a:t>
             </a:r>
-          </a:p>
-          <a:p>
-            <a:r>
-              <a:rPr lang="de-DE" dirty="0">
-                <a:solidFill>
-                  <a:srgbClr val="2A00FF"/>
-                </a:solidFill>
-                <a:latin typeface="Consolas" panose="020B0609020204030204" pitchFamily="49" charset="0"/>
-              </a:rPr>
-              <a:t>  </a:t>
-            </a:r>
-            <a:r>
-              <a:rPr lang="de-DE" dirty="0" err="1">
-                <a:solidFill>
-                  <a:srgbClr val="2A00FF"/>
-                </a:solidFill>
-                <a:latin typeface="Consolas" panose="020B0609020204030204" pitchFamily="49" charset="0"/>
-              </a:rPr>
-              <a:t>team.setTitle</a:t>
-            </a:r>
-            <a:r>
-              <a:rPr lang="de-DE" dirty="0">
-                <a:solidFill>
-                  <a:srgbClr val="2A00FF"/>
-                </a:solidFill>
-                <a:latin typeface="Consolas" panose="020B0609020204030204" pitchFamily="49" charset="0"/>
-              </a:rPr>
-              <a:t>(</a:t>
-            </a:r>
-            <a:r>
-              <a:rPr lang="de-DE" dirty="0" err="1">
-                <a:solidFill>
-                  <a:srgbClr val="2A00FF"/>
-                </a:solidFill>
-                <a:latin typeface="Consolas" panose="020B0609020204030204" pitchFamily="49" charset="0"/>
-              </a:rPr>
-              <a:t>QA.title</a:t>
-            </a:r>
-            <a:r>
-              <a:rPr lang="de-DE" dirty="0">
-                <a:solidFill>
-                  <a:srgbClr val="2A00FF"/>
-                </a:solidFill>
-                <a:latin typeface="Consolas" panose="020B0609020204030204" pitchFamily="49" charset="0"/>
-              </a:rPr>
-              <a:t>)</a:t>
-            </a:r>
-          </a:p>
-          <a:p>
-            <a:r>
-              <a:rPr lang="de-DE" dirty="0">
-                <a:solidFill>
-                  <a:srgbClr val="2A00FF"/>
-                </a:solidFill>
-                <a:latin typeface="Consolas" panose="020B0609020204030204" pitchFamily="49" charset="0"/>
-              </a:rPr>
-              <a:t>  </a:t>
-            </a:r>
-            <a:r>
-              <a:rPr lang="de-DE" dirty="0" err="1">
-                <a:solidFill>
-                  <a:srgbClr val="2A00FF"/>
-                </a:solidFill>
-                <a:latin typeface="Consolas" panose="020B0609020204030204" pitchFamily="49" charset="0"/>
-              </a:rPr>
-              <a:t>team.setDescription</a:t>
-            </a:r>
-            <a:r>
-              <a:rPr lang="de-DE" dirty="0">
-                <a:solidFill>
-                  <a:srgbClr val="2A00FF"/>
-                </a:solidFill>
-                <a:latin typeface="Consolas" panose="020B0609020204030204" pitchFamily="49" charset="0"/>
-              </a:rPr>
-              <a:t>(</a:t>
-            </a:r>
-            <a:r>
-              <a:rPr lang="de-DE" dirty="0" err="1">
-                <a:solidFill>
-                  <a:srgbClr val="2A00FF"/>
-                </a:solidFill>
-                <a:latin typeface="Consolas" panose="020B0609020204030204" pitchFamily="49" charset="0"/>
-              </a:rPr>
-              <a:t>QA.description</a:t>
-            </a:r>
-            <a:r>
-              <a:rPr lang="de-DE" dirty="0">
-                <a:solidFill>
-                  <a:srgbClr val="2A00FF"/>
-                </a:solidFill>
-                <a:latin typeface="Consolas" panose="020B0609020204030204" pitchFamily="49" charset="0"/>
-              </a:rPr>
-              <a:t>)</a:t>
-            </a:r>
-          </a:p>
-          <a:p>
-            <a:r>
-              <a:rPr lang="de-DE" dirty="0">
-                <a:solidFill>
-                  <a:srgbClr val="2A00FF"/>
-                </a:solidFill>
-                <a:latin typeface="Consolas" panose="020B0609020204030204" pitchFamily="49" charset="0"/>
-              </a:rPr>
-              <a:t>  </a:t>
-            </a:r>
-            <a:r>
-              <a:rPr lang="de-DE" dirty="0" err="1">
-                <a:solidFill>
-                  <a:srgbClr val="2A00FF"/>
-                </a:solidFill>
-                <a:latin typeface="Consolas" panose="020B0609020204030204" pitchFamily="49" charset="0"/>
-              </a:rPr>
-              <a:t>team.setMembersize</a:t>
-            </a:r>
-            <a:r>
-              <a:rPr lang="de-DE" dirty="0">
-                <a:solidFill>
-                  <a:srgbClr val="2A00FF"/>
-                </a:solidFill>
-                <a:latin typeface="Consolas" panose="020B0609020204030204" pitchFamily="49" charset="0"/>
-              </a:rPr>
-              <a:t>(</a:t>
-            </a:r>
-            <a:r>
-              <a:rPr lang="de-DE" dirty="0" err="1">
-                <a:solidFill>
-                  <a:srgbClr val="2A00FF"/>
-                </a:solidFill>
-                <a:latin typeface="Consolas" panose="020B0609020204030204" pitchFamily="49" charset="0"/>
-              </a:rPr>
-              <a:t>QA.membersize</a:t>
-            </a:r>
-            <a:r>
-              <a:rPr lang="de-DE" dirty="0">
-                <a:solidFill>
-                  <a:srgbClr val="2A00FF"/>
-                </a:solidFill>
-                <a:latin typeface="Consolas" panose="020B0609020204030204" pitchFamily="49" charset="0"/>
-              </a:rPr>
-              <a:t>)</a:t>
-            </a:r>
-          </a:p>
-          <a:p>
-            <a:r>
-              <a:rPr lang="de-DE" dirty="0">
-                <a:solidFill>
-                  <a:srgbClr val="2A00FF"/>
-                </a:solidFill>
-                <a:latin typeface="Consolas" panose="020B0609020204030204" pitchFamily="49" charset="0"/>
-              </a:rPr>
-              <a:t>    </a:t>
-            </a:r>
-          </a:p>
-          <a:p>
-            <a:r>
-              <a:rPr lang="de-DE" dirty="0">
-                <a:solidFill>
-                  <a:srgbClr val="2A00FF"/>
-                </a:solidFill>
-                <a:latin typeface="Consolas" panose="020B0609020204030204" pitchFamily="49" charset="0"/>
-              </a:rPr>
-              <a:t>  </a:t>
-            </a:r>
-            <a:r>
-              <a:rPr lang="de-DE" dirty="0" err="1">
-                <a:solidFill>
-                  <a:srgbClr val="2A00FF"/>
-                </a:solidFill>
-                <a:latin typeface="Consolas" panose="020B0609020204030204" pitchFamily="49" charset="0"/>
-              </a:rPr>
-              <a:t>def</a:t>
-            </a:r>
-            <a:r>
-              <a:rPr lang="de-DE" dirty="0">
-                <a:solidFill>
-                  <a:srgbClr val="2A00FF"/>
-                </a:solidFill>
-                <a:latin typeface="Consolas" panose="020B0609020204030204" pitchFamily="49" charset="0"/>
-              </a:rPr>
-              <a:t> </a:t>
-            </a:r>
-            <a:r>
-              <a:rPr lang="de-DE" dirty="0" err="1">
-                <a:solidFill>
-                  <a:srgbClr val="2A00FF"/>
-                </a:solidFill>
-                <a:latin typeface="Consolas" panose="020B0609020204030204" pitchFamily="49" charset="0"/>
-              </a:rPr>
-              <a:t>persons</a:t>
-            </a:r>
-            <a:r>
-              <a:rPr lang="de-DE" dirty="0">
-                <a:solidFill>
-                  <a:srgbClr val="2A00FF"/>
-                </a:solidFill>
-                <a:latin typeface="Consolas" panose="020B0609020204030204" pitchFamily="49" charset="0"/>
-              </a:rPr>
-              <a:t> = </a:t>
-            </a:r>
-            <a:r>
-              <a:rPr lang="de-DE" dirty="0" err="1">
-                <a:solidFill>
-                  <a:srgbClr val="2A00FF"/>
-                </a:solidFill>
-                <a:latin typeface="Consolas" panose="020B0609020204030204" pitchFamily="49" charset="0"/>
-              </a:rPr>
-              <a:t>sut.findPersons</a:t>
-            </a:r>
-            <a:r>
-              <a:rPr lang="de-DE" dirty="0">
-                <a:solidFill>
-                  <a:srgbClr val="2A00FF"/>
-                </a:solidFill>
-                <a:latin typeface="Consolas" panose="020B0609020204030204" pitchFamily="49" charset="0"/>
-              </a:rPr>
-              <a:t>(</a:t>
-            </a:r>
-            <a:r>
-              <a:rPr lang="de-DE" dirty="0" err="1">
-                <a:solidFill>
-                  <a:srgbClr val="2A00FF"/>
-                </a:solidFill>
-                <a:latin typeface="Consolas" panose="020B0609020204030204" pitchFamily="49" charset="0"/>
-              </a:rPr>
-              <a:t>team</a:t>
-            </a:r>
-            <a:r>
-              <a:rPr lang="de-DE" dirty="0">
-                <a:solidFill>
-                  <a:srgbClr val="2A00FF"/>
-                </a:solidFill>
-                <a:latin typeface="Consolas" panose="020B0609020204030204" pitchFamily="49" charset="0"/>
-              </a:rPr>
-              <a:t>)</a:t>
-            </a:r>
-          </a:p>
-          <a:p>
             <a:endParaRPr lang="de-DE" dirty="0">
               <a:solidFill>
                 <a:srgbClr val="2A00FF"/>
@@ -10373,82 +10393,241 @@
             </a:endParaRPr>
           </a:p>
           <a:p>
-            <a:r>
-              <a:rPr lang="de-DE" dirty="0">
-                <a:solidFill>
-                  <a:srgbClr val="2A00FF"/>
-                </a:solidFill>
-                <a:latin typeface="Consolas" panose="020B0609020204030204" pitchFamily="49" charset="0"/>
-              </a:rPr>
-              <a:t>  </a:t>
+            <a:endParaRPr lang="de-DE" dirty="0" smtClean="0">
+              <a:solidFill>
+                <a:srgbClr val="000000"/>
+              </a:solidFill>
+              <a:latin typeface="Consolas" panose="020B0609020204030204" pitchFamily="49" charset="0"/>
+            </a:endParaRPr>
+          </a:p>
+          <a:p>
+            <a:r>
+              <a:rPr lang="de-DE" dirty="0">
+                <a:solidFill>
+                  <a:srgbClr val="000000"/>
+                </a:solidFill>
+                <a:latin typeface="Consolas" panose="020B0609020204030204" pitchFamily="49" charset="0"/>
+              </a:rPr>
+              <a:t> </a:t>
+            </a:r>
+            <a:r>
+              <a:rPr lang="de-DE" dirty="0" smtClean="0">
+                <a:solidFill>
+                  <a:srgbClr val="000000"/>
+                </a:solidFill>
+                <a:latin typeface="Consolas" panose="020B0609020204030204" pitchFamily="49" charset="0"/>
+              </a:rPr>
+              <a:t> </a:t>
+            </a:r>
+            <a:r>
+              <a:rPr lang="de-DE" b="1" dirty="0" err="1">
+                <a:solidFill>
+                  <a:srgbClr val="972C78"/>
+                </a:solidFill>
+                <a:latin typeface="Consolas" panose="020B0609020204030204" pitchFamily="49" charset="0"/>
+              </a:rPr>
+              <a:t>def</a:t>
+            </a:r>
+            <a:r>
+              <a:rPr lang="de-DE" b="1" dirty="0">
+                <a:solidFill>
+                  <a:srgbClr val="000000"/>
+                </a:solidFill>
+                <a:latin typeface="Consolas" panose="020B0609020204030204" pitchFamily="49" charset="0"/>
+              </a:rPr>
+              <a:t> </a:t>
             </a:r>
             <a:r>
               <a:rPr lang="de-DE" dirty="0" err="1">
                 <a:solidFill>
-                  <a:srgbClr val="2A00FF"/>
+                  <a:srgbClr val="000000"/>
+                </a:solidFill>
+                <a:latin typeface="Consolas" panose="020B0609020204030204" pitchFamily="49" charset="0"/>
+              </a:rPr>
+              <a:t>persons</a:t>
+            </a:r>
+            <a:r>
+              <a:rPr lang="de-DE" dirty="0">
+                <a:solidFill>
+                  <a:srgbClr val="000000"/>
+                </a:solidFill>
+                <a:latin typeface="Consolas" panose="020B0609020204030204" pitchFamily="49" charset="0"/>
+              </a:rPr>
+              <a:t> = </a:t>
+            </a:r>
+            <a:r>
+              <a:rPr lang="de-DE" dirty="0" err="1">
+                <a:solidFill>
+                  <a:srgbClr val="0000C0"/>
+                </a:solidFill>
+                <a:latin typeface="Consolas" panose="020B0609020204030204" pitchFamily="49" charset="0"/>
+              </a:rPr>
+              <a:t>sut</a:t>
+            </a:r>
+            <a:r>
+              <a:rPr lang="de-DE" dirty="0" err="1">
+                <a:solidFill>
+                  <a:srgbClr val="000000"/>
+                </a:solidFill>
+                <a:latin typeface="Consolas" panose="020B0609020204030204" pitchFamily="49" charset="0"/>
+              </a:rPr>
+              <a:t>.findPersons</a:t>
+            </a:r>
+            <a:r>
+              <a:rPr lang="de-DE" dirty="0">
+                <a:solidFill>
+                  <a:srgbClr val="000000"/>
+                </a:solidFill>
+                <a:latin typeface="Consolas" panose="020B0609020204030204" pitchFamily="49" charset="0"/>
+              </a:rPr>
+              <a:t>(</a:t>
+            </a:r>
+            <a:r>
+              <a:rPr lang="de-DE" dirty="0" err="1">
+                <a:solidFill>
+                  <a:srgbClr val="000000"/>
+                </a:solidFill>
+                <a:latin typeface="Consolas" panose="020B0609020204030204" pitchFamily="49" charset="0"/>
+              </a:rPr>
+              <a:t>team</a:t>
+            </a:r>
+            <a:r>
+              <a:rPr lang="de-DE" dirty="0">
+                <a:solidFill>
+                  <a:srgbClr val="000000"/>
+                </a:solidFill>
+                <a:latin typeface="Consolas" panose="020B0609020204030204" pitchFamily="49" charset="0"/>
+              </a:rPr>
+              <a:t>)</a:t>
+            </a:r>
+            <a:endParaRPr lang="de-DE" dirty="0">
+              <a:solidFill>
+                <a:srgbClr val="2A00FF"/>
+              </a:solidFill>
+              <a:latin typeface="Consolas" panose="020B0609020204030204" pitchFamily="49" charset="0"/>
+            </a:endParaRPr>
+          </a:p>
+          <a:p>
+            <a:endParaRPr lang="de-DE" i="1" dirty="0" smtClean="0">
+              <a:solidFill>
+                <a:srgbClr val="000000"/>
+              </a:solidFill>
+              <a:latin typeface="Consolas" panose="020B0609020204030204" pitchFamily="49" charset="0"/>
+            </a:endParaRPr>
+          </a:p>
+          <a:p>
+            <a:r>
+              <a:rPr lang="de-DE" i="1" dirty="0">
+                <a:solidFill>
+                  <a:srgbClr val="000000"/>
+                </a:solidFill>
+                <a:latin typeface="Consolas" panose="020B0609020204030204" pitchFamily="49" charset="0"/>
+              </a:rPr>
+              <a:t> </a:t>
+            </a:r>
+            <a:r>
+              <a:rPr lang="de-DE" i="1" dirty="0" smtClean="0">
+                <a:solidFill>
+                  <a:srgbClr val="000000"/>
+                </a:solidFill>
+                <a:latin typeface="Consolas" panose="020B0609020204030204" pitchFamily="49" charset="0"/>
+              </a:rPr>
+              <a:t> </a:t>
+            </a:r>
+            <a:r>
+              <a:rPr lang="de-DE" i="1" dirty="0" err="1" smtClean="0">
+                <a:solidFill>
+                  <a:srgbClr val="000000"/>
                 </a:solidFill>
                 <a:latin typeface="Consolas" panose="020B0609020204030204" pitchFamily="49" charset="0"/>
               </a:rPr>
               <a:t>assertThat</a:t>
             </a:r>
             <a:r>
-              <a:rPr lang="de-DE" dirty="0">
-                <a:solidFill>
-                  <a:srgbClr val="2A00FF"/>
+              <a:rPr lang="de-DE" dirty="0" smtClean="0">
+                <a:solidFill>
+                  <a:srgbClr val="000000"/>
                 </a:solidFill>
                 <a:latin typeface="Consolas" panose="020B0609020204030204" pitchFamily="49" charset="0"/>
               </a:rPr>
               <a:t>(</a:t>
             </a:r>
             <a:r>
+              <a:rPr lang="de-DE" dirty="0" err="1" smtClean="0">
+                <a:solidFill>
+                  <a:srgbClr val="000000"/>
+                </a:solidFill>
+                <a:latin typeface="Consolas" panose="020B0609020204030204" pitchFamily="49" charset="0"/>
+              </a:rPr>
+              <a:t>persons</a:t>
+            </a:r>
+            <a:r>
+              <a:rPr lang="de-DE" dirty="0">
+                <a:solidFill>
+                  <a:srgbClr val="000000"/>
+                </a:solidFill>
+                <a:latin typeface="Consolas" panose="020B0609020204030204" pitchFamily="49" charset="0"/>
+              </a:rPr>
+              <a:t>).</a:t>
+            </a:r>
+            <a:r>
               <a:rPr lang="de-DE" dirty="0" err="1">
                 <a:solidFill>
-                  <a:srgbClr val="2A00FF"/>
-                </a:solidFill>
-                <a:latin typeface="Consolas" panose="020B0609020204030204" pitchFamily="49" charset="0"/>
-              </a:rPr>
-              <a:t>persons</a:t>
-            </a:r>
-            <a:r>
-              <a:rPr lang="de-DE" dirty="0">
-                <a:solidFill>
-                  <a:srgbClr val="2A00FF"/>
-                </a:solidFill>
-                <a:latin typeface="Consolas" panose="020B0609020204030204" pitchFamily="49" charset="0"/>
-              </a:rPr>
-              <a:t>).</a:t>
+                  <a:srgbClr val="000000"/>
+                </a:solidFill>
+                <a:latin typeface="Consolas" panose="020B0609020204030204" pitchFamily="49" charset="0"/>
+              </a:rPr>
+              <a:t>hasSize</a:t>
+            </a:r>
+            <a:r>
+              <a:rPr lang="de-DE" dirty="0">
+                <a:solidFill>
+                  <a:srgbClr val="000000"/>
+                </a:solidFill>
+                <a:latin typeface="Consolas" panose="020B0609020204030204" pitchFamily="49" charset="0"/>
+              </a:rPr>
+              <a:t>(</a:t>
             </a:r>
             <a:r>
               <a:rPr lang="de-DE" dirty="0" err="1">
                 <a:solidFill>
-                  <a:srgbClr val="2A00FF"/>
-                </a:solidFill>
-                <a:latin typeface="Consolas" panose="020B0609020204030204" pitchFamily="49" charset="0"/>
-              </a:rPr>
-              <a:t>hasSize</a:t>
-            </a:r>
-            <a:r>
-              <a:rPr lang="de-DE" dirty="0">
-                <a:solidFill>
-                  <a:srgbClr val="2A00FF"/>
-                </a:solidFill>
-                <a:latin typeface="Consolas" panose="020B0609020204030204" pitchFamily="49" charset="0"/>
-              </a:rPr>
-              <a:t>(</a:t>
+                  <a:srgbClr val="0000C0"/>
+                </a:solidFill>
+                <a:latin typeface="Consolas" panose="020B0609020204030204" pitchFamily="49" charset="0"/>
+              </a:rPr>
+              <a:t>dataSet</a:t>
             </a:r>
             <a:r>
               <a:rPr lang="de-DE" dirty="0" err="1">
                 <a:solidFill>
-                  <a:srgbClr val="2A00FF"/>
-                </a:solidFill>
-                <a:latin typeface="Consolas" panose="020B0609020204030204" pitchFamily="49" charset="0"/>
-              </a:rPr>
-              <a:t>dataSet.personsTable.getRowCount</a:t>
-            </a:r>
-            <a:r>
-              <a:rPr lang="de-DE" dirty="0">
-                <a:solidFill>
-                  <a:srgbClr val="2A00FF"/>
+                  <a:srgbClr val="000000"/>
+                </a:solidFill>
+                <a:latin typeface="Consolas" panose="020B0609020204030204" pitchFamily="49" charset="0"/>
+              </a:rPr>
+              <a:t>.</a:t>
+            </a:r>
+            <a:r>
+              <a:rPr lang="de-DE" dirty="0" err="1">
+                <a:solidFill>
+                  <a:srgbClr val="0000C0"/>
+                </a:solidFill>
+                <a:latin typeface="Consolas" panose="020B0609020204030204" pitchFamily="49" charset="0"/>
+              </a:rPr>
+              <a:t>personsTable</a:t>
+            </a:r>
+            <a:r>
+              <a:rPr lang="de-DE" dirty="0" err="1">
+                <a:solidFill>
+                  <a:srgbClr val="000000"/>
+                </a:solidFill>
+                <a:latin typeface="Consolas" panose="020B0609020204030204" pitchFamily="49" charset="0"/>
+              </a:rPr>
+              <a:t>.getRowCount</a:t>
+            </a:r>
+            <a:r>
+              <a:rPr lang="de-DE" dirty="0">
+                <a:solidFill>
+                  <a:srgbClr val="000000"/>
                 </a:solidFill>
                 <a:latin typeface="Consolas" panose="020B0609020204030204" pitchFamily="49" charset="0"/>
               </a:rPr>
@@ -10459,7 +10638,7 @@
             <a:r>
               <a:rPr lang="de-DE" dirty="0">
                 <a:solidFill>
-                  <a:srgbClr val="2A00FF"/>
+                  <a:srgbClr val="000000"/>
                 </a:solidFill>
                 <a:latin typeface="Consolas" panose="020B0609020204030204" pitchFamily="49" charset="0"/>
               </a:rPr>
@@ -10642,12 +10821,24 @@
             <a:pPr marL="0" indent="0">
               <a:buNone/>
             </a:pPr>
-            <a:endParaRPr lang="de-DE" sz="4800" dirty="0"/>
-          </a:p>
-          <a:p>
+            <a:endParaRPr lang="de-DE" sz="1800" dirty="0" smtClean="0">
+              <a:solidFill>
+                <a:srgbClr val="000000"/>
+              </a:solidFill>
+              <a:latin typeface="Consolas" panose="020B0609020204030204" pitchFamily="49" charset="0"/>
+            </a:endParaRPr>
+          </a:p>
+          <a:p>
+            <a:endParaRPr lang="de-DE" dirty="0"/>
+          </a:p>
+          <a:p>
+            <a:r>
+              <a:rPr lang="de-DE" dirty="0" smtClean="0"/>
+              <a:t>Mehrfach-Vererbung</a:t>
+            </a:r>
             <a:r>
               <a:rPr lang="de-DE" dirty="0"/>
-              <a:t>Mehrfach-Vererbung:</a:t>
+              <a:t>:</a:t>
             </a:r>
           </a:p>
           <a:p>
@@ -10717,13 +10908,49 @@
           <a:lstStyle/>
           <a:p>
             <a:r>
+              <a:rPr lang="de-DE" b="1" dirty="0" err="1">
+                <a:solidFill>
+                  <a:srgbClr val="972C78"/>
+                </a:solidFill>
+                <a:latin typeface="Consolas" panose="020B0609020204030204" pitchFamily="49" charset="0"/>
+              </a:rPr>
+              <a:t>class</a:t>
+            </a:r>
+            <a:r>
+              <a:rPr lang="de-DE" dirty="0">
+                <a:solidFill>
+                  <a:srgbClr val="2A00FF"/>
+                </a:solidFill>
+                <a:latin typeface="Consolas" panose="020B0609020204030204" pitchFamily="49" charset="0"/>
+              </a:rPr>
+              <a:t> </a:t>
+            </a:r>
+            <a:r>
               <a:rPr lang="de-DE" dirty="0" err="1">
                 <a:solidFill>
+                  <a:srgbClr val="000000"/>
+                </a:solidFill>
+                <a:latin typeface="Consolas" panose="020B0609020204030204" pitchFamily="49" charset="0"/>
+              </a:rPr>
+              <a:t>ExtendedDataSet</a:t>
+            </a:r>
+            <a:r>
+              <a:rPr lang="de-DE" dirty="0">
+                <a:solidFill>
                   <a:srgbClr val="2A00FF"/>
                 </a:solidFill>
                 <a:latin typeface="Consolas" panose="020B0609020204030204" pitchFamily="49" charset="0"/>
               </a:rPr>
-              <a:t>class</a:t>
+              <a:t> </a:t>
+            </a:r>
+            <a:r>
+              <a:rPr lang="de-DE" b="1" dirty="0" err="1">
+                <a:solidFill>
+                  <a:srgbClr val="972C78"/>
+                </a:solidFill>
+                <a:latin typeface="Consolas" panose="020B0609020204030204" pitchFamily="49" charset="0"/>
+              </a:rPr>
+              <a:t>extends</a:t>
             </a:r>
             <a:r>
               <a:rPr lang="de-DE" dirty="0">
@@ -10737,11 +10964,48 @@
             <a:r>
               <a:rPr lang="de-DE" dirty="0" err="1">
                 <a:solidFill>
+                  <a:srgbClr val="000000"/>
+                </a:solidFill>
+                <a:latin typeface="Consolas" panose="020B0609020204030204" pitchFamily="49" charset="0"/>
+              </a:rPr>
+              <a:t>PersonDatabaseBuilder</a:t>
+            </a:r>
+            <a:endParaRPr lang="de-DE" dirty="0">
+              <a:solidFill>
+                <a:srgbClr val="000000"/>
+              </a:solidFill>
+              <a:latin typeface="Consolas" panose="020B0609020204030204" pitchFamily="49" charset="0"/>
+            </a:endParaRPr>
+          </a:p>
+          <a:p>
+            <a:r>
+              <a:rPr lang="de-DE" dirty="0">
+                <a:solidFill>
+                  <a:srgbClr val="000000"/>
+                </a:solidFill>
+                <a:latin typeface="Consolas" panose="020B0609020204030204" pitchFamily="49" charset="0"/>
+              </a:rPr>
+              <a:t>{</a:t>
+            </a:r>
+          </a:p>
+          <a:p>
+            <a:r>
+              <a:rPr lang="de-DE" dirty="0">
+                <a:solidFill>
                   <a:srgbClr val="2A00FF"/>
                 </a:solidFill>
                 <a:latin typeface="Consolas" panose="020B0609020204030204" pitchFamily="49" charset="0"/>
               </a:rPr>
-              <a:t>ExtendedDataSet</a:t>
+              <a:t>  </a:t>
+            </a:r>
+            <a:r>
+              <a:rPr lang="de-DE" b="1" dirty="0" err="1">
+                <a:solidFill>
+                  <a:srgbClr val="972C78"/>
+                </a:solidFill>
+                <a:latin typeface="Consolas" panose="020B0609020204030204" pitchFamily="49" charset="0"/>
+              </a:rPr>
+              <a:t>def</a:t>
             </a:r>
             <a:r>
               <a:rPr lang="de-DE" dirty="0">
@@ -10755,30 +11019,41 @@
             <a:r>
               <a:rPr lang="de-DE" dirty="0" err="1">
                 <a:solidFill>
-                  <a:srgbClr val="2A00FF"/>
-                </a:solidFill>
-                <a:latin typeface="Consolas" panose="020B0609020204030204" pitchFamily="49" charset="0"/>
-              </a:rPr>
-              <a:t>extends</a:t>
-            </a:r>
-            <a:r>
-              <a:rPr lang="de-DE" dirty="0">
-                <a:solidFill>
-                  <a:srgbClr val="2A00FF"/>
-                </a:solidFill>
-                <a:latin typeface="Consolas" panose="020B0609020204030204" pitchFamily="49" charset="0"/>
-              </a:rPr>
-              <a:t> </a:t>
+                  <a:srgbClr val="000000"/>
+                </a:solidFill>
+                <a:latin typeface="Consolas" panose="020B0609020204030204" pitchFamily="49" charset="0"/>
+              </a:rPr>
+              <a:t>extendsDataSet</a:t>
+            </a:r>
+            <a:r>
+              <a:rPr lang="de-DE" dirty="0">
+                <a:solidFill>
+                  <a:srgbClr val="000000"/>
+                </a:solidFill>
+                <a:latin typeface="Consolas" panose="020B0609020204030204" pitchFamily="49" charset="0"/>
+              </a:rPr>
+              <a:t>() { </a:t>
             </a:r>
             <a:r>
               <a:rPr lang="de-DE" dirty="0" err="1">
                 <a:solidFill>
-                  <a:srgbClr val="2A00FF"/>
-                </a:solidFill>
-                <a:latin typeface="Consolas" panose="020B0609020204030204" pitchFamily="49" charset="0"/>
-              </a:rPr>
-              <a:t>PersonDatabaseBuilder</a:t>
-            </a:r>
+                  <a:srgbClr val="000000"/>
+                </a:solidFill>
+                <a:latin typeface="Consolas" panose="020B0609020204030204" pitchFamily="49" charset="0"/>
+              </a:rPr>
+              <a:t>DemoDataSet</a:t>
+            </a:r>
+            <a:r>
+              <a:rPr lang="de-DE" dirty="0">
+                <a:solidFill>
+                  <a:srgbClr val="000000"/>
+                </a:solidFill>
+                <a:latin typeface="Consolas" panose="020B0609020204030204" pitchFamily="49" charset="0"/>
+              </a:rPr>
+              <a:t> }</a:t>
+            </a:r>
+          </a:p>
+          <a:p>
             <a:endParaRPr lang="de-DE" dirty="0">
               <a:solidFill>
                 <a:srgbClr val="2A00FF"/>
@@ -10794,10 +11069,17 @@
                 </a:solidFill>
                 <a:latin typeface="Consolas" panose="020B0609020204030204" pitchFamily="49" charset="0"/>
               </a:rPr>
-              <a:t>{</a:t>
-            </a:r>
-          </a:p>
-          <a:p>
+              <a:t>  </a:t>
+            </a:r>
+            <a:r>
+              <a:rPr lang="de-DE" b="1" dirty="0" err="1">
+                <a:solidFill>
+                  <a:srgbClr val="972C78"/>
+                </a:solidFill>
+                <a:latin typeface="Consolas" panose="020B0609020204030204" pitchFamily="49" charset="0"/>
+              </a:rPr>
+              <a:t>def</a:t>
+            </a:r>
             <a:r>
               <a:rPr lang="de-DE" dirty="0">
                 <a:solidFill>
@@ -10805,17 +11087,84 @@
                 </a:solidFill>
                 <a:latin typeface="Consolas" panose="020B0609020204030204" pitchFamily="49" charset="0"/>
               </a:rPr>
-              <a:t>  </a:t>
+              <a:t> </a:t>
             </a:r>
             <a:r>
               <a:rPr lang="de-DE" dirty="0" err="1">
                 <a:solidFill>
+                  <a:srgbClr val="000000"/>
+                </a:solidFill>
+                <a:latin typeface="Consolas" panose="020B0609020204030204" pitchFamily="49" charset="0"/>
+              </a:rPr>
+              <a:t>relations</a:t>
+            </a:r>
+            <a:r>
+              <a:rPr lang="de-DE" dirty="0">
+                <a:solidFill>
+                  <a:srgbClr val="000000"/>
+                </a:solidFill>
+                <a:latin typeface="Consolas" panose="020B0609020204030204" pitchFamily="49" charset="0"/>
+              </a:rPr>
+              <a:t>() {</a:t>
+            </a:r>
+          </a:p>
+          <a:p>
+            <a:r>
+              <a:rPr lang="de-DE" dirty="0">
+                <a:solidFill>
                   <a:srgbClr val="2A00FF"/>
                 </a:solidFill>
                 <a:latin typeface="Consolas" panose="020B0609020204030204" pitchFamily="49" charset="0"/>
               </a:rPr>
-              <a:t>def</a:t>
-            </a:r>
+              <a:t>    </a:t>
+            </a:r>
+            <a:r>
+              <a:rPr lang="de-DE" i="1" dirty="0" err="1">
+                <a:solidFill>
+                  <a:srgbClr val="0000C0"/>
+                </a:solidFill>
+                <a:latin typeface="Consolas" panose="020B0609020204030204" pitchFamily="49" charset="0"/>
+              </a:rPr>
+              <a:t>HOCHLEITER</a:t>
+            </a:r>
+            <a:r>
+              <a:rPr lang="de-DE" dirty="0" err="1">
+                <a:solidFill>
+                  <a:srgbClr val="000000"/>
+                </a:solidFill>
+                <a:latin typeface="Consolas" panose="020B0609020204030204" pitchFamily="49" charset="0"/>
+              </a:rPr>
+              <a:t>.belongsTo</a:t>
+            </a:r>
+            <a:r>
+              <a:rPr lang="de-DE" dirty="0">
+                <a:solidFill>
+                  <a:srgbClr val="000000"/>
+                </a:solidFill>
+                <a:latin typeface="Consolas" panose="020B0609020204030204" pitchFamily="49" charset="0"/>
+              </a:rPr>
+              <a:t>(</a:t>
+            </a:r>
+            <a:r>
+              <a:rPr lang="de-DE" i="1" dirty="0">
+                <a:solidFill>
+                  <a:srgbClr val="0000C0"/>
+                </a:solidFill>
+                <a:latin typeface="Consolas" panose="020B0609020204030204" pitchFamily="49" charset="0"/>
+              </a:rPr>
+              <a:t>QA</a:t>
+            </a:r>
+            <a:r>
+              <a:rPr lang="de-DE" dirty="0">
+                <a:solidFill>
+                  <a:srgbClr val="000000"/>
+                </a:solidFill>
+                <a:latin typeface="Consolas" panose="020B0609020204030204" pitchFamily="49" charset="0"/>
+              </a:rPr>
+              <a:t>)</a:t>
+            </a:r>
+          </a:p>
+          <a:p>
             <a:r>
               <a:rPr lang="de-DE" dirty="0">
                 <a:solidFill>
@@ -10823,163 +11172,59 @@
                 </a:solidFill>
                 <a:latin typeface="Consolas" panose="020B0609020204030204" pitchFamily="49" charset="0"/>
               </a:rPr>
-              <a:t> </a:t>
+              <a:t>    </a:t>
+            </a:r>
+            <a:r>
+              <a:rPr lang="de-DE" i="1" dirty="0" err="1">
+                <a:solidFill>
+                  <a:srgbClr val="0000C0"/>
+                </a:solidFill>
+                <a:latin typeface="Consolas" panose="020B0609020204030204" pitchFamily="49" charset="0"/>
+              </a:rPr>
+              <a:t>HOCHLEITER</a:t>
             </a:r>
             <a:r>
               <a:rPr lang="de-DE" dirty="0" err="1">
                 <a:solidFill>
-                  <a:srgbClr val="2A00FF"/>
-                </a:solidFill>
-                <a:latin typeface="Consolas" panose="020B0609020204030204" pitchFamily="49" charset="0"/>
-              </a:rPr>
-              <a:t>extendsDataSet</a:t>
-            </a:r>
-            <a:r>
-              <a:rPr lang="de-DE" dirty="0">
-                <a:solidFill>
-                  <a:srgbClr val="2A00FF"/>
-                </a:solidFill>
-                <a:latin typeface="Consolas" panose="020B0609020204030204" pitchFamily="49" charset="0"/>
-              </a:rPr>
-              <a:t>() { </a:t>
-            </a:r>
-            <a:r>
-              <a:rPr lang="de-DE" dirty="0" err="1">
-                <a:solidFill>
-                  <a:srgbClr val="2A00FF"/>
-                </a:solidFill>
-                <a:latin typeface="Consolas" panose="020B0609020204030204" pitchFamily="49" charset="0"/>
-              </a:rPr>
-              <a:t>DemoDataSet</a:t>
-            </a:r>
-            <a:r>
-              <a:rPr lang="de-DE" dirty="0">
-                <a:solidFill>
-                  <a:srgbClr val="2A00FF"/>
-                </a:solidFill>
-                <a:latin typeface="Consolas" panose="020B0609020204030204" pitchFamily="49" charset="0"/>
-              </a:rPr>
-              <a:t> }</a:t>
-            </a:r>
-          </a:p>
-          <a:p>
-            <a:endParaRPr lang="de-DE" dirty="0">
-              <a:solidFill>
-                <a:srgbClr val="2A00FF"/>
-              </a:solidFill>
-              <a:latin typeface="Consolas" panose="020B0609020204030204" pitchFamily="49" charset="0"/>
-            </a:endParaRPr>
-          </a:p>
-          <a:p>
-            <a:r>
-              <a:rPr lang="de-DE" dirty="0">
-                <a:solidFill>
-                  <a:srgbClr val="2A00FF"/>
-                </a:solidFill>
-                <a:latin typeface="Consolas" panose="020B0609020204030204" pitchFamily="49" charset="0"/>
-              </a:rPr>
-              <a:t>  </a:t>
-            </a:r>
-            <a:r>
-              <a:rPr lang="de-DE" dirty="0" err="1">
-                <a:solidFill>
-                  <a:srgbClr val="2A00FF"/>
-                </a:solidFill>
-                <a:latin typeface="Consolas" panose="020B0609020204030204" pitchFamily="49" charset="0"/>
-              </a:rPr>
-              <a:t>def</a:t>
-            </a:r>
-            <a:r>
-              <a:rPr lang="de-DE" dirty="0">
-                <a:solidFill>
-                  <a:srgbClr val="2A00FF"/>
-                </a:solidFill>
-                <a:latin typeface="Consolas" panose="020B0609020204030204" pitchFamily="49" charset="0"/>
-              </a:rPr>
-              <a:t> </a:t>
-            </a:r>
-            <a:r>
-              <a:rPr lang="de-DE" dirty="0" err="1">
-                <a:solidFill>
-                  <a:srgbClr val="2A00FF"/>
-                </a:solidFill>
-                <a:latin typeface="Consolas" panose="020B0609020204030204" pitchFamily="49" charset="0"/>
-              </a:rPr>
-              <a:t>relations</a:t>
-            </a:r>
-            <a:r>
-              <a:rPr lang="de-DE" dirty="0">
-                <a:solidFill>
-                  <a:srgbClr val="2A00FF"/>
-                </a:solidFill>
-                <a:latin typeface="Consolas" panose="020B0609020204030204" pitchFamily="49" charset="0"/>
-              </a:rPr>
-              <a:t>() {</a:t>
-            </a:r>
-          </a:p>
-          <a:p>
-            <a:r>
-              <a:rPr lang="de-DE" dirty="0">
-                <a:solidFill>
-                  <a:srgbClr val="2A00FF"/>
-                </a:solidFill>
-                <a:latin typeface="Consolas" panose="020B0609020204030204" pitchFamily="49" charset="0"/>
-              </a:rPr>
-              <a:t>    </a:t>
-            </a:r>
-            <a:r>
-              <a:rPr lang="de-DE" dirty="0" err="1">
-                <a:solidFill>
-                  <a:srgbClr val="2A00FF"/>
-                </a:solidFill>
-                <a:latin typeface="Consolas" panose="020B0609020204030204" pitchFamily="49" charset="0"/>
-              </a:rPr>
-              <a:t>HOCHLEITER.belongsTo</a:t>
-            </a:r>
-            <a:r>
-              <a:rPr lang="de-DE" dirty="0">
-                <a:solidFill>
-                  <a:srgbClr val="2A00FF"/>
-                </a:solidFill>
-                <a:latin typeface="Consolas" panose="020B0609020204030204" pitchFamily="49" charset="0"/>
-              </a:rPr>
-              <a:t>(QA)</a:t>
-            </a:r>
-          </a:p>
-          <a:p>
-            <a:r>
-              <a:rPr lang="de-DE" dirty="0">
-                <a:solidFill>
-                  <a:srgbClr val="2A00FF"/>
-                </a:solidFill>
-                <a:latin typeface="Consolas" panose="020B0609020204030204" pitchFamily="49" charset="0"/>
-              </a:rPr>
-              <a:t>    </a:t>
-            </a:r>
-            <a:r>
-              <a:rPr lang="de-DE" dirty="0" err="1">
-                <a:solidFill>
-                  <a:srgbClr val="2A00FF"/>
-                </a:solidFill>
-                <a:latin typeface="Consolas" panose="020B0609020204030204" pitchFamily="49" charset="0"/>
-              </a:rPr>
-              <a:t>HOCHLEITER.worksAs</a:t>
-            </a:r>
-            <a:r>
-              <a:rPr lang="de-DE" dirty="0">
-                <a:solidFill>
-                  <a:srgbClr val="2A00FF"/>
-                </a:solidFill>
-                <a:latin typeface="Consolas" panose="020B0609020204030204" pitchFamily="49" charset="0"/>
-              </a:rPr>
-              <a:t>(SWT)</a:t>
-            </a:r>
-          </a:p>
-          <a:p>
-            <a:r>
-              <a:rPr lang="de-DE" dirty="0">
-                <a:solidFill>
-                  <a:srgbClr val="2A00FF"/>
+                  <a:srgbClr val="000000"/>
+                </a:solidFill>
+                <a:latin typeface="Consolas" panose="020B0609020204030204" pitchFamily="49" charset="0"/>
+              </a:rPr>
+              <a:t>.worksAs</a:t>
+            </a:r>
+            <a:r>
+              <a:rPr lang="de-DE" dirty="0">
+                <a:solidFill>
+                  <a:srgbClr val="000000"/>
+                </a:solidFill>
+                <a:latin typeface="Consolas" panose="020B0609020204030204" pitchFamily="49" charset="0"/>
+              </a:rPr>
+              <a:t>(</a:t>
+            </a:r>
+            <a:r>
+              <a:rPr lang="de-DE" i="1" dirty="0">
+                <a:solidFill>
+                  <a:srgbClr val="0000C0"/>
+                </a:solidFill>
+                <a:latin typeface="Consolas" panose="020B0609020204030204" pitchFamily="49" charset="0"/>
+              </a:rPr>
+              <a:t>SWT</a:t>
+            </a:r>
+            <a:r>
+              <a:rPr lang="de-DE" dirty="0">
+                <a:solidFill>
+                  <a:srgbClr val="000000"/>
+                </a:solidFill>
+                <a:latin typeface="Consolas" panose="020B0609020204030204" pitchFamily="49" charset="0"/>
+              </a:rPr>
+              <a:t>)</a:t>
+            </a:r>
+          </a:p>
+          <a:p>
+            <a:r>
+              <a:rPr lang="de-DE" dirty="0">
+                <a:solidFill>
+                  <a:srgbClr val="000000"/>
                 </a:solidFill>
                 <a:latin typeface="Consolas" panose="020B0609020204030204" pitchFamily="49" charset="0"/>
               </a:rPr>
@@ -10990,7 +11235,7 @@
             <a:r>
               <a:rPr lang="de-DE" dirty="0">
                 <a:solidFill>
-                  <a:srgbClr val="2A00FF"/>
+                  <a:srgbClr val="000000"/>
                 </a:solidFill>
                 <a:latin typeface="Consolas" panose="020B0609020204030204" pitchFamily="49" charset="0"/>
               </a:rPr>
@@ -11028,13 +11273,49 @@
           <a:lstStyle/>
           <a:p>
             <a:r>
+              <a:rPr lang="de-DE" b="1" dirty="0" err="1">
+                <a:solidFill>
+                  <a:srgbClr val="972C78"/>
+                </a:solidFill>
+                <a:latin typeface="Consolas" panose="020B0609020204030204" pitchFamily="49" charset="0"/>
+              </a:rPr>
+              <a:t>class</a:t>
+            </a:r>
+            <a:r>
+              <a:rPr lang="de-DE" dirty="0">
+                <a:solidFill>
+                  <a:srgbClr val="2A00FF"/>
+                </a:solidFill>
+                <a:latin typeface="Consolas" panose="020B0609020204030204" pitchFamily="49" charset="0"/>
+              </a:rPr>
+              <a:t> </a:t>
+            </a:r>
+            <a:r>
               <a:rPr lang="de-DE" dirty="0" err="1">
                 <a:solidFill>
+                  <a:srgbClr val="000000"/>
+                </a:solidFill>
+                <a:latin typeface="Consolas" panose="020B0609020204030204" pitchFamily="49" charset="0"/>
+              </a:rPr>
+              <a:t>ComposedDataSet</a:t>
+            </a:r>
+            <a:r>
+              <a:rPr lang="de-DE" dirty="0">
+                <a:solidFill>
                   <a:srgbClr val="2A00FF"/>
                 </a:solidFill>
                 <a:latin typeface="Consolas" panose="020B0609020204030204" pitchFamily="49" charset="0"/>
               </a:rPr>
-              <a:t>class</a:t>
+              <a:t> </a:t>
+            </a:r>
+            <a:r>
+              <a:rPr lang="de-DE" b="1" dirty="0" err="1">
+                <a:solidFill>
+                  <a:srgbClr val="972C78"/>
+                </a:solidFill>
+                <a:latin typeface="Consolas" panose="020B0609020204030204" pitchFamily="49" charset="0"/>
+              </a:rPr>
+              <a:t>extends</a:t>
             </a:r>
             <a:r>
               <a:rPr lang="de-DE" dirty="0">
@@ -11048,43 +11329,7 @@
             <a:r>
               <a:rPr lang="de-DE" dirty="0" err="1">
                 <a:solidFill>
-                  <a:srgbClr val="2A00FF"/>
-                </a:solidFill>
-                <a:latin typeface="Consolas" panose="020B0609020204030204" pitchFamily="49" charset="0"/>
-              </a:rPr>
-              <a:t>ComposedDataSet</a:t>
-            </a:r>
-            <a:r>
-              <a:rPr lang="de-DE" dirty="0">
-                <a:solidFill>
-                  <a:srgbClr val="2A00FF"/>
-                </a:solidFill>
-                <a:latin typeface="Consolas" panose="020B0609020204030204" pitchFamily="49" charset="0"/>
-              </a:rPr>
-              <a:t> </a:t>
-            </a:r>
-            <a:r>
-              <a:rPr lang="de-DE" dirty="0" err="1">
-                <a:solidFill>
-                  <a:srgbClr val="2A00FF"/>
-                </a:solidFill>
-                <a:latin typeface="Consolas" panose="020B0609020204030204" pitchFamily="49" charset="0"/>
-              </a:rPr>
-              <a:t>extends</a:t>
-            </a:r>
-            <a:r>
-              <a:rPr lang="de-DE" dirty="0">
-                <a:solidFill>
-                  <a:srgbClr val="2A00FF"/>
-                </a:solidFill>
-                <a:latin typeface="Consolas" panose="020B0609020204030204" pitchFamily="49" charset="0"/>
-              </a:rPr>
-              <a:t> </a:t>
-            </a:r>
-            <a:r>
-              <a:rPr lang="de-DE" dirty="0" err="1">
-                <a:solidFill>
-                  <a:srgbClr val="2A00FF"/>
+                  <a:srgbClr val="000000"/>
                 </a:solidFill>
                 <a:latin typeface="Consolas" panose="020B0609020204030204" pitchFamily="49" charset="0"/>
               </a:rPr>
@@ -11092,7 +11337,7 @@
             </a:r>
             <a:endParaRPr lang="de-DE" dirty="0">
               <a:solidFill>
-                <a:srgbClr val="2A00FF"/>
+                <a:srgbClr val="000000"/>
               </a:solidFill>
               <a:latin typeface="Consolas" panose="020B0609020204030204" pitchFamily="49" charset="0"/>
             </a:endParaRPr>
@@ -11101,14 +11346,32 @@
             <a:r>
               <a:rPr lang="de-DE" dirty="0">
                 <a:solidFill>
+                  <a:srgbClr val="000000"/>
+                </a:solidFill>
+                <a:latin typeface="Consolas" panose="020B0609020204030204" pitchFamily="49" charset="0"/>
+              </a:rPr>
+              <a:t>{</a:t>
+            </a:r>
+          </a:p>
+          <a:p>
+            <a:r>
+              <a:rPr lang="de-DE" dirty="0">
+                <a:solidFill>
                   <a:srgbClr val="2A00FF"/>
                 </a:solidFill>
                 <a:latin typeface="Consolas" panose="020B0609020204030204" pitchFamily="49" charset="0"/>
               </a:rPr>
-              <a:t>{</a:t>
-            </a:r>
-          </a:p>
-          <a:p>
+              <a:t>  </a:t>
+            </a:r>
+            <a:r>
+              <a:rPr lang="de-DE" b="1" dirty="0" err="1">
+                <a:solidFill>
+                  <a:srgbClr val="972C78"/>
+                </a:solidFill>
+                <a:latin typeface="Consolas" panose="020B0609020204030204" pitchFamily="49" charset="0"/>
+              </a:rPr>
+              <a:t>def</a:t>
+            </a:r>
             <a:r>
               <a:rPr lang="de-DE" dirty="0">
                 <a:solidFill>
@@ -11116,30 +11379,12 @@
                 </a:solidFill>
                 <a:latin typeface="Consolas" panose="020B0609020204030204" pitchFamily="49" charset="0"/>
               </a:rPr>
-              <a:t>  </a:t>
+              <a:t> </a:t>
             </a:r>
             <a:r>
               <a:rPr lang="de-DE" dirty="0" err="1">
                 <a:solidFill>
-                  <a:srgbClr val="2A00FF"/>
-                </a:solidFill>
-                <a:latin typeface="Consolas" panose="020B0609020204030204" pitchFamily="49" charset="0"/>
-              </a:rPr>
-              <a:t>def</a:t>
-            </a:r>
-            <a:r>
-              <a:rPr lang="de-DE" dirty="0">
-                <a:solidFill>
-                  <a:srgbClr val="2A00FF"/>
-                </a:solidFill>
-                <a:latin typeface="Consolas" panose="020B0609020204030204" pitchFamily="49" charset="0"/>
-              </a:rPr>
-              <a:t> </a:t>
-            </a:r>
-            <a:r>
-              <a:rPr lang="de-DE" dirty="0" err="1">
-                <a:solidFill>
-                  <a:srgbClr val="2A00FF"/>
+                  <a:srgbClr val="000000"/>
                 </a:solidFill>
                 <a:latin typeface="Consolas" panose="020B0609020204030204" pitchFamily="49" charset="0"/>
               </a:rPr>
@@ -11148,7 +11393,7 @@
             <a:r>
               <a:rPr lang="de-DE" dirty="0">
                 <a:solidFill>
-                  <a:srgbClr val="2A00FF"/>
+                  <a:srgbClr val="000000"/>
                 </a:solidFill>
                 <a:latin typeface="Consolas" panose="020B0609020204030204" pitchFamily="49" charset="0"/>
               </a:rPr>
@@ -11159,7 +11404,7 @@
             <a:r>
               <a:rPr lang="de-DE" dirty="0">
                 <a:solidFill>
-                  <a:srgbClr val="2A00FF"/>
+                  <a:srgbClr val="000000"/>
                 </a:solidFill>
                 <a:latin typeface="Consolas" panose="020B0609020204030204" pitchFamily="49" charset="0"/>
               </a:rPr>

</xml_diff>